<commit_message>
Added embedded link to Steve Jobs video
</commit_message>
<xml_diff>
--- a/Senior Engineer Technical Track for Beer City Code.pptx
+++ b/Senior Engineer Technical Track for Beer City Code.pptx
@@ -5,30 +5,31 @@
     <p:sldMasterId id="2147483648" r:id="rId1"/>
   </p:sldMasterIdLst>
   <p:notesMasterIdLst>
-    <p:notesMasterId r:id="rId23"/>
+    <p:notesMasterId r:id="rId24"/>
   </p:notesMasterIdLst>
   <p:sldIdLst>
     <p:sldId id="256" r:id="rId2"/>
-    <p:sldId id="279" r:id="rId3"/>
-    <p:sldId id="257" r:id="rId4"/>
+    <p:sldId id="257" r:id="rId3"/>
+    <p:sldId id="279" r:id="rId4"/>
     <p:sldId id="258" r:id="rId5"/>
     <p:sldId id="260" r:id="rId6"/>
     <p:sldId id="262" r:id="rId7"/>
-    <p:sldId id="263" r:id="rId8"/>
-    <p:sldId id="271" r:id="rId9"/>
-    <p:sldId id="272" r:id="rId10"/>
-    <p:sldId id="273" r:id="rId11"/>
-    <p:sldId id="264" r:id="rId12"/>
-    <p:sldId id="265" r:id="rId13"/>
-    <p:sldId id="267" r:id="rId14"/>
-    <p:sldId id="268" r:id="rId15"/>
-    <p:sldId id="266" r:id="rId16"/>
-    <p:sldId id="269" r:id="rId17"/>
-    <p:sldId id="275" r:id="rId18"/>
-    <p:sldId id="270" r:id="rId19"/>
-    <p:sldId id="274" r:id="rId20"/>
-    <p:sldId id="276" r:id="rId21"/>
-    <p:sldId id="259" r:id="rId22"/>
+    <p:sldId id="280" r:id="rId8"/>
+    <p:sldId id="263" r:id="rId9"/>
+    <p:sldId id="271" r:id="rId10"/>
+    <p:sldId id="272" r:id="rId11"/>
+    <p:sldId id="273" r:id="rId12"/>
+    <p:sldId id="264" r:id="rId13"/>
+    <p:sldId id="265" r:id="rId14"/>
+    <p:sldId id="267" r:id="rId15"/>
+    <p:sldId id="268" r:id="rId16"/>
+    <p:sldId id="266" r:id="rId17"/>
+    <p:sldId id="269" r:id="rId18"/>
+    <p:sldId id="275" r:id="rId19"/>
+    <p:sldId id="270" r:id="rId20"/>
+    <p:sldId id="274" r:id="rId21"/>
+    <p:sldId id="276" r:id="rId22"/>
+    <p:sldId id="259" r:id="rId23"/>
   </p:sldIdLst>
   <p:sldSz cx="12192000" cy="6858000"/>
   <p:notesSz cx="6858000" cy="9144000"/>
@@ -217,7 +218,7 @@
           <a:p>
             <a:fld id="{3A8CE07B-66F1-3E43-A331-45926454BED1}" type="datetimeFigureOut">
               <a:rPr lang="en-US" smtClean="0"/>
-              <a:t>7/25/22</a:t>
+              <a:t>8/5/22</a:t>
             </a:fld>
             <a:endParaRPr lang="en-US"/>
           </a:p>
@@ -3627,7 +3628,7 @@
             </a:pPr>
             <a:r>
               <a:rPr lang="en-US" sz="7200" dirty="0"/>
-              <a:t>I tried being a manager</a:t>
+              <a:t>I get bored!</a:t>
             </a:r>
           </a:p>
         </p:txBody>
@@ -3665,7 +3666,7 @@
     </p:spTree>
     <p:extLst>
       <p:ext uri="{BB962C8B-B14F-4D97-AF65-F5344CB8AC3E}">
-        <p14:creationId xmlns:p14="http://schemas.microsoft.com/office/powerpoint/2010/main" val="86084922"/>
+        <p14:creationId xmlns:p14="http://schemas.microsoft.com/office/powerpoint/2010/main" val="2091710618"/>
       </p:ext>
     </p:extLst>
   </p:cSld>
@@ -3697,7 +3698,7 @@
           <p:cNvPr id="2" name="Title 1">
             <a:extLst>
               <a:ext uri="{FF2B5EF4-FFF2-40B4-BE49-F238E27FC236}">
-                <a16:creationId xmlns:a16="http://schemas.microsoft.com/office/drawing/2014/main" id="{046C8D2E-713F-9042-90AA-BFE98C586712}"/>
+                <a16:creationId xmlns:a16="http://schemas.microsoft.com/office/drawing/2014/main" id="{3C78E026-5B3C-C842-B969-79D5E8A37872}"/>
               </a:ext>
             </a:extLst>
           </p:cNvPr>
@@ -3722,10 +3723,49 @@
       </p:sp>
       <p:sp>
         <p:nvSpPr>
+          <p:cNvPr id="3" name="Content Placeholder 2">
+            <a:extLst>
+              <a:ext uri="{FF2B5EF4-FFF2-40B4-BE49-F238E27FC236}">
+                <a16:creationId xmlns:a16="http://schemas.microsoft.com/office/drawing/2014/main" id="{0FE3D2A5-9567-6242-A50F-2703D6E506D6}"/>
+              </a:ext>
+            </a:extLst>
+          </p:cNvPr>
+          <p:cNvSpPr>
+            <a:spLocks noGrp="1"/>
+          </p:cNvSpPr>
+          <p:nvPr>
+            <p:ph idx="1"/>
+          </p:nvPr>
+        </p:nvSpPr>
+        <p:spPr/>
+        <p:txBody>
+          <a:bodyPr anchor="t">
+            <a:normAutofit/>
+          </a:bodyPr>
+          <a:lstStyle/>
+          <a:p>
+            <a:pPr marL="0" indent="0" algn="ctr">
+              <a:buNone/>
+            </a:pPr>
+            <a:endParaRPr lang="en-US" sz="7200" dirty="0"/>
+          </a:p>
+          <a:p>
+            <a:pPr marL="0" indent="0" algn="ctr">
+              <a:buNone/>
+            </a:pPr>
+            <a:r>
+              <a:rPr lang="en-US" sz="7200" dirty="0"/>
+              <a:t>I tried being a manager</a:t>
+            </a:r>
+          </a:p>
+        </p:txBody>
+      </p:sp>
+      <p:sp>
+        <p:nvSpPr>
           <p:cNvPr id="4" name="Slide Number Placeholder 3">
             <a:extLst>
               <a:ext uri="{FF2B5EF4-FFF2-40B4-BE49-F238E27FC236}">
-                <a16:creationId xmlns:a16="http://schemas.microsoft.com/office/drawing/2014/main" id="{46F014FB-E04F-C146-B592-A1B69A6E6BFB}"/>
+                <a16:creationId xmlns:a16="http://schemas.microsoft.com/office/drawing/2014/main" id="{0686524B-ED86-2643-AEBD-27FBF59B1869}"/>
               </a:ext>
             </a:extLst>
           </p:cNvPr>
@@ -3745,6 +3785,94 @@
               <a:rPr lang="en-US" smtClean="0"/>
               <a:pPr/>
               <a:t>11</a:t>
+            </a:fld>
+            <a:endParaRPr lang="en-US" dirty="0"/>
+          </a:p>
+        </p:txBody>
+      </p:sp>
+    </p:spTree>
+    <p:extLst>
+      <p:ext uri="{BB962C8B-B14F-4D97-AF65-F5344CB8AC3E}">
+        <p14:creationId xmlns:p14="http://schemas.microsoft.com/office/powerpoint/2010/main" val="86084922"/>
+      </p:ext>
+    </p:extLst>
+  </p:cSld>
+  <p:clrMapOvr>
+    <a:masterClrMapping/>
+  </p:clrMapOvr>
+</p:sld>
+</file>
+
+<file path=ppt/slides/slide12.xml><?xml version="1.0" encoding="utf-8"?>
+<p:sld xmlns:a="http://schemas.openxmlformats.org/drawingml/2006/main" xmlns:r="http://schemas.openxmlformats.org/officeDocument/2006/relationships" xmlns:p="http://schemas.openxmlformats.org/presentationml/2006/main">
+  <p:cSld>
+    <p:spTree>
+      <p:nvGrpSpPr>
+        <p:cNvPr id="1" name=""/>
+        <p:cNvGrpSpPr/>
+        <p:nvPr/>
+      </p:nvGrpSpPr>
+      <p:grpSpPr>
+        <a:xfrm>
+          <a:off x="0" y="0"/>
+          <a:ext cx="0" cy="0"/>
+          <a:chOff x="0" y="0"/>
+          <a:chExt cx="0" cy="0"/>
+        </a:xfrm>
+      </p:grpSpPr>
+      <p:sp>
+        <p:nvSpPr>
+          <p:cNvPr id="2" name="Title 1">
+            <a:extLst>
+              <a:ext uri="{FF2B5EF4-FFF2-40B4-BE49-F238E27FC236}">
+                <a16:creationId xmlns:a16="http://schemas.microsoft.com/office/drawing/2014/main" id="{046C8D2E-713F-9042-90AA-BFE98C586712}"/>
+              </a:ext>
+            </a:extLst>
+          </p:cNvPr>
+          <p:cNvSpPr>
+            <a:spLocks noGrp="1"/>
+          </p:cNvSpPr>
+          <p:nvPr>
+            <p:ph type="title"/>
+          </p:nvPr>
+        </p:nvSpPr>
+        <p:spPr/>
+        <p:txBody>
+          <a:bodyPr/>
+          <a:lstStyle/>
+          <a:p>
+            <a:r>
+              <a:rPr lang="en-US" dirty="0"/>
+              <a:t>How I got here</a:t>
+            </a:r>
+          </a:p>
+        </p:txBody>
+      </p:sp>
+      <p:sp>
+        <p:nvSpPr>
+          <p:cNvPr id="4" name="Slide Number Placeholder 3">
+            <a:extLst>
+              <a:ext uri="{FF2B5EF4-FFF2-40B4-BE49-F238E27FC236}">
+                <a16:creationId xmlns:a16="http://schemas.microsoft.com/office/drawing/2014/main" id="{46F014FB-E04F-C146-B592-A1B69A6E6BFB}"/>
+              </a:ext>
+            </a:extLst>
+          </p:cNvPr>
+          <p:cNvSpPr>
+            <a:spLocks noGrp="1"/>
+          </p:cNvSpPr>
+          <p:nvPr>
+            <p:ph type="sldNum" sz="quarter" idx="12"/>
+          </p:nvPr>
+        </p:nvSpPr>
+        <p:spPr/>
+        <p:txBody>
+          <a:bodyPr/>
+          <a:lstStyle/>
+          <a:p>
+            <a:fld id="{79CE343B-16C6-1B41-BE63-A1DE79C858D9}" type="slidenum">
+              <a:rPr lang="en-US" smtClean="0"/>
+              <a:pPr/>
+              <a:t>12</a:t>
             </a:fld>
             <a:endParaRPr lang="en-US" dirty="0"/>
           </a:p>
@@ -4495,128 +4623,6 @@
 </p:sld>
 </file>
 
-<file path=ppt/slides/slide12.xml><?xml version="1.0" encoding="utf-8"?>
-<p:sld xmlns:a="http://schemas.openxmlformats.org/drawingml/2006/main" xmlns:r="http://schemas.openxmlformats.org/officeDocument/2006/relationships" xmlns:p="http://schemas.openxmlformats.org/presentationml/2006/main">
-  <p:cSld>
-    <p:spTree>
-      <p:nvGrpSpPr>
-        <p:cNvPr id="1" name=""/>
-        <p:cNvGrpSpPr/>
-        <p:nvPr/>
-      </p:nvGrpSpPr>
-      <p:grpSpPr>
-        <a:xfrm>
-          <a:off x="0" y="0"/>
-          <a:ext cx="0" cy="0"/>
-          <a:chOff x="0" y="0"/>
-          <a:chExt cx="0" cy="0"/>
-        </a:xfrm>
-      </p:grpSpPr>
-      <p:sp>
-        <p:nvSpPr>
-          <p:cNvPr id="2" name="Title 1">
-            <a:extLst>
-              <a:ext uri="{FF2B5EF4-FFF2-40B4-BE49-F238E27FC236}">
-                <a16:creationId xmlns:a16="http://schemas.microsoft.com/office/drawing/2014/main" id="{50AD4EDA-EA70-EB4C-B583-552BDF269C2B}"/>
-              </a:ext>
-            </a:extLst>
-          </p:cNvPr>
-          <p:cNvSpPr>
-            <a:spLocks noGrp="1"/>
-          </p:cNvSpPr>
-          <p:nvPr>
-            <p:ph type="title"/>
-          </p:nvPr>
-        </p:nvSpPr>
-        <p:spPr/>
-        <p:txBody>
-          <a:bodyPr/>
-          <a:lstStyle/>
-          <a:p>
-            <a:r>
-              <a:rPr lang="en-US" dirty="0"/>
-              <a:t>Commitment</a:t>
-            </a:r>
-          </a:p>
-        </p:txBody>
-      </p:sp>
-      <p:sp>
-        <p:nvSpPr>
-          <p:cNvPr id="3" name="Content Placeholder 2">
-            <a:extLst>
-              <a:ext uri="{FF2B5EF4-FFF2-40B4-BE49-F238E27FC236}">
-                <a16:creationId xmlns:a16="http://schemas.microsoft.com/office/drawing/2014/main" id="{323F7406-9BFE-A949-AC4E-9972D9219D8E}"/>
-              </a:ext>
-            </a:extLst>
-          </p:cNvPr>
-          <p:cNvSpPr>
-            <a:spLocks noGrp="1"/>
-          </p:cNvSpPr>
-          <p:nvPr>
-            <p:ph idx="1"/>
-          </p:nvPr>
-        </p:nvSpPr>
-        <p:spPr/>
-        <p:txBody>
-          <a:bodyPr/>
-          <a:lstStyle/>
-          <a:p>
-            <a:r>
-              <a:rPr lang="en-US" dirty="0"/>
-              <a:t>What is your dream job?</a:t>
-            </a:r>
-          </a:p>
-          <a:p>
-            <a:r>
-              <a:rPr lang="en-US" dirty="0"/>
-              <a:t>Use this as your career guidepost</a:t>
-            </a:r>
-          </a:p>
-        </p:txBody>
-      </p:sp>
-      <p:sp>
-        <p:nvSpPr>
-          <p:cNvPr id="4" name="Slide Number Placeholder 3">
-            <a:extLst>
-              <a:ext uri="{FF2B5EF4-FFF2-40B4-BE49-F238E27FC236}">
-                <a16:creationId xmlns:a16="http://schemas.microsoft.com/office/drawing/2014/main" id="{68AC9AF4-F0E1-114B-A321-5800C8159C28}"/>
-              </a:ext>
-            </a:extLst>
-          </p:cNvPr>
-          <p:cNvSpPr>
-            <a:spLocks noGrp="1"/>
-          </p:cNvSpPr>
-          <p:nvPr>
-            <p:ph type="sldNum" sz="quarter" idx="12"/>
-          </p:nvPr>
-        </p:nvSpPr>
-        <p:spPr/>
-        <p:txBody>
-          <a:bodyPr/>
-          <a:lstStyle/>
-          <a:p>
-            <a:fld id="{79CE343B-16C6-1B41-BE63-A1DE79C858D9}" type="slidenum">
-              <a:rPr lang="en-US" smtClean="0"/>
-              <a:pPr/>
-              <a:t>12</a:t>
-            </a:fld>
-            <a:endParaRPr lang="en-US" dirty="0"/>
-          </a:p>
-        </p:txBody>
-      </p:sp>
-    </p:spTree>
-    <p:extLst>
-      <p:ext uri="{BB962C8B-B14F-4D97-AF65-F5344CB8AC3E}">
-        <p14:creationId xmlns:p14="http://schemas.microsoft.com/office/powerpoint/2010/main" val="2921791469"/>
-      </p:ext>
-    </p:extLst>
-  </p:cSld>
-  <p:clrMapOvr>
-    <a:masterClrMapping/>
-  </p:clrMapOvr>
-</p:sld>
-</file>
-
 <file path=ppt/slides/slide13.xml><?xml version="1.0" encoding="utf-8"?>
 <p:sld xmlns:a="http://schemas.openxmlformats.org/drawingml/2006/main" xmlns:r="http://schemas.openxmlformats.org/officeDocument/2006/relationships" xmlns:p="http://schemas.openxmlformats.org/presentationml/2006/main">
   <p:cSld>
@@ -4639,7 +4645,7 @@
           <p:cNvPr id="2" name="Title 1">
             <a:extLst>
               <a:ext uri="{FF2B5EF4-FFF2-40B4-BE49-F238E27FC236}">
-                <a16:creationId xmlns:a16="http://schemas.microsoft.com/office/drawing/2014/main" id="{9ED78FD0-BEF0-C842-8419-6E6B8166C7DE}"/>
+                <a16:creationId xmlns:a16="http://schemas.microsoft.com/office/drawing/2014/main" id="{50AD4EDA-EA70-EB4C-B583-552BDF269C2B}"/>
               </a:ext>
             </a:extLst>
           </p:cNvPr>
@@ -4657,7 +4663,7 @@
           <a:p>
             <a:r>
               <a:rPr lang="en-US" dirty="0"/>
-              <a:t>Challenge yourself</a:t>
+              <a:t>Commitment</a:t>
             </a:r>
           </a:p>
         </p:txBody>
@@ -4667,7 +4673,7 @@
           <p:cNvPr id="3" name="Content Placeholder 2">
             <a:extLst>
               <a:ext uri="{FF2B5EF4-FFF2-40B4-BE49-F238E27FC236}">
-                <a16:creationId xmlns:a16="http://schemas.microsoft.com/office/drawing/2014/main" id="{4B2C5757-EDD9-C34B-93EC-C7F99D7B63CA}"/>
+                <a16:creationId xmlns:a16="http://schemas.microsoft.com/office/drawing/2014/main" id="{323F7406-9BFE-A949-AC4E-9972D9219D8E}"/>
               </a:ext>
             </a:extLst>
           </p:cNvPr>
@@ -4685,27 +4691,13 @@
           <a:p>
             <a:r>
               <a:rPr lang="en-US" dirty="0"/>
-              <a:t>Get </a:t>
-            </a:r>
-            <a:r>
-              <a:rPr lang="en-US" dirty="0" err="1"/>
-              <a:t>sh</a:t>
-            </a:r>
+              <a:t>What is your dream job?</a:t>
+            </a:r>
+          </a:p>
+          <a:p>
             <a:r>
               <a:rPr lang="en-US" dirty="0"/>
-              <a:t>*t done</a:t>
-            </a:r>
-          </a:p>
-          <a:p>
-            <a:r>
-              <a:rPr lang="en-US" dirty="0"/>
-              <a:t>Excel at what you are doing</a:t>
-            </a:r>
-          </a:p>
-          <a:p>
-            <a:r>
-              <a:rPr lang="en-US" dirty="0"/>
-              <a:t>Get out of your comfort zone</a:t>
+              <a:t>Use this as your career guidepost</a:t>
             </a:r>
           </a:p>
         </p:txBody>
@@ -4715,7 +4707,7 @@
           <p:cNvPr id="4" name="Slide Number Placeholder 3">
             <a:extLst>
               <a:ext uri="{FF2B5EF4-FFF2-40B4-BE49-F238E27FC236}">
-                <a16:creationId xmlns:a16="http://schemas.microsoft.com/office/drawing/2014/main" id="{F562658A-4AD6-2848-A063-A8B5DF0E6956}"/>
+                <a16:creationId xmlns:a16="http://schemas.microsoft.com/office/drawing/2014/main" id="{68AC9AF4-F0E1-114B-A321-5800C8159C28}"/>
               </a:ext>
             </a:extLst>
           </p:cNvPr>
@@ -4743,7 +4735,7 @@
     </p:spTree>
     <p:extLst>
       <p:ext uri="{BB962C8B-B14F-4D97-AF65-F5344CB8AC3E}">
-        <p14:creationId xmlns:p14="http://schemas.microsoft.com/office/powerpoint/2010/main" val="297064646"/>
+        <p14:creationId xmlns:p14="http://schemas.microsoft.com/office/powerpoint/2010/main" val="2921791469"/>
       </p:ext>
     </p:extLst>
   </p:cSld>
@@ -4775,7 +4767,7 @@
           <p:cNvPr id="2" name="Title 1">
             <a:extLst>
               <a:ext uri="{FF2B5EF4-FFF2-40B4-BE49-F238E27FC236}">
-                <a16:creationId xmlns:a16="http://schemas.microsoft.com/office/drawing/2014/main" id="{ECBE87CA-A835-F34F-A979-A9F721BCE331}"/>
+                <a16:creationId xmlns:a16="http://schemas.microsoft.com/office/drawing/2014/main" id="{9ED78FD0-BEF0-C842-8419-6E6B8166C7DE}"/>
               </a:ext>
             </a:extLst>
           </p:cNvPr>
@@ -4793,7 +4785,7 @@
           <a:p>
             <a:r>
               <a:rPr lang="en-US" dirty="0"/>
-              <a:t>Imposter Syndrome</a:t>
+              <a:t>Challenge yourself</a:t>
             </a:r>
           </a:p>
         </p:txBody>
@@ -4803,7 +4795,7 @@
           <p:cNvPr id="3" name="Content Placeholder 2">
             <a:extLst>
               <a:ext uri="{FF2B5EF4-FFF2-40B4-BE49-F238E27FC236}">
-                <a16:creationId xmlns:a16="http://schemas.microsoft.com/office/drawing/2014/main" id="{AF1363D3-F663-0249-9F01-507F194D9528}"/>
+                <a16:creationId xmlns:a16="http://schemas.microsoft.com/office/drawing/2014/main" id="{4B2C5757-EDD9-C34B-93EC-C7F99D7B63CA}"/>
               </a:ext>
             </a:extLst>
           </p:cNvPr>
@@ -4820,48 +4812,28 @@
           <a:lstStyle/>
           <a:p>
             <a:r>
-              <a:rPr lang="en-US" b="1" u="sng" dirty="0">
-                <a:solidFill>
-                  <a:schemeClr val="tx1"/>
-                </a:solidFill>
-              </a:rPr>
-              <a:t>What if</a:t>
-            </a:r>
-            <a:r>
-              <a:rPr lang="en-US" b="1" dirty="0">
-                <a:solidFill>
-                  <a:schemeClr val="tx1"/>
-                </a:solidFill>
-              </a:rPr>
-              <a:t> </a:t>
-            </a:r>
-            <a:r>
               <a:rPr lang="en-US" dirty="0"/>
-              <a:t>I’m not good enough, I don’t know enough?</a:t>
-            </a:r>
-          </a:p>
-          <a:p>
+              <a:t>Get </a:t>
+            </a:r>
+            <a:r>
+              <a:rPr lang="en-US" dirty="0" err="1"/>
+              <a:t>sh</a:t>
+            </a:r>
             <a:r>
               <a:rPr lang="en-US" dirty="0"/>
-              <a:t>Can lead to staying in your comfort zone</a:t>
+              <a:t>*t done</a:t>
             </a:r>
           </a:p>
           <a:p>
             <a:r>
               <a:rPr lang="en-US" dirty="0"/>
-              <a:t>Trust yourself and your abilities</a:t>
+              <a:t>Excel at what you are doing</a:t>
             </a:r>
           </a:p>
           <a:p>
             <a:r>
               <a:rPr lang="en-US" dirty="0"/>
-              <a:t>Be proud of your accomplishments and sell them</a:t>
-            </a:r>
-          </a:p>
-          <a:p>
-            <a:r>
-              <a:rPr lang="en-US" dirty="0"/>
-              <a:t>It’s OK to say “I don’t know”</a:t>
+              <a:t>Get out of your comfort zone</a:t>
             </a:r>
           </a:p>
         </p:txBody>
@@ -4871,7 +4843,7 @@
           <p:cNvPr id="4" name="Slide Number Placeholder 3">
             <a:extLst>
               <a:ext uri="{FF2B5EF4-FFF2-40B4-BE49-F238E27FC236}">
-                <a16:creationId xmlns:a16="http://schemas.microsoft.com/office/drawing/2014/main" id="{0EE6CF6C-B0BC-444F-9FDF-4F179F64516E}"/>
+                <a16:creationId xmlns:a16="http://schemas.microsoft.com/office/drawing/2014/main" id="{F562658A-4AD6-2848-A063-A8B5DF0E6956}"/>
               </a:ext>
             </a:extLst>
           </p:cNvPr>
@@ -4899,7 +4871,7 @@
     </p:spTree>
     <p:extLst>
       <p:ext uri="{BB962C8B-B14F-4D97-AF65-F5344CB8AC3E}">
-        <p14:creationId xmlns:p14="http://schemas.microsoft.com/office/powerpoint/2010/main" val="8074757"/>
+        <p14:creationId xmlns:p14="http://schemas.microsoft.com/office/powerpoint/2010/main" val="297064646"/>
       </p:ext>
     </p:extLst>
   </p:cSld>
@@ -4931,7 +4903,7 @@
           <p:cNvPr id="2" name="Title 1">
             <a:extLst>
               <a:ext uri="{FF2B5EF4-FFF2-40B4-BE49-F238E27FC236}">
-                <a16:creationId xmlns:a16="http://schemas.microsoft.com/office/drawing/2014/main" id="{8954AD0F-5B5A-C941-B4A0-24D02EF1C004}"/>
+                <a16:creationId xmlns:a16="http://schemas.microsoft.com/office/drawing/2014/main" id="{ECBE87CA-A835-F34F-A979-A9F721BCE331}"/>
               </a:ext>
             </a:extLst>
           </p:cNvPr>
@@ -4949,7 +4921,7 @@
           <a:p>
             <a:r>
               <a:rPr lang="en-US" dirty="0"/>
-              <a:t>Advocates</a:t>
+              <a:t>Imposter Syndrome</a:t>
             </a:r>
           </a:p>
         </p:txBody>
@@ -4959,7 +4931,7 @@
           <p:cNvPr id="3" name="Content Placeholder 2">
             <a:extLst>
               <a:ext uri="{FF2B5EF4-FFF2-40B4-BE49-F238E27FC236}">
-                <a16:creationId xmlns:a16="http://schemas.microsoft.com/office/drawing/2014/main" id="{429A578A-09F8-7C47-B721-D07BAB53784F}"/>
+                <a16:creationId xmlns:a16="http://schemas.microsoft.com/office/drawing/2014/main" id="{AF1363D3-F663-0249-9F01-507F194D9528}"/>
               </a:ext>
             </a:extLst>
           </p:cNvPr>
@@ -4976,26 +4948,48 @@
           <a:lstStyle/>
           <a:p>
             <a:r>
+              <a:rPr lang="en-US" b="1" u="sng" dirty="0">
+                <a:solidFill>
+                  <a:schemeClr val="tx1"/>
+                </a:solidFill>
+              </a:rPr>
+              <a:t>What if</a:t>
+            </a:r>
+            <a:r>
+              <a:rPr lang="en-US" b="1" dirty="0">
+                <a:solidFill>
+                  <a:schemeClr val="tx1"/>
+                </a:solidFill>
+              </a:rPr>
+              <a:t> </a:t>
+            </a:r>
+            <a:r>
               <a:rPr lang="en-US" dirty="0"/>
-              <a:t>Yourself</a:t>
+              <a:t>I’m not good enough, I don’t know enough?</a:t>
             </a:r>
           </a:p>
           <a:p>
             <a:r>
               <a:rPr lang="en-US" dirty="0"/>
-              <a:t>Your manager</a:t>
+              <a:t>Can lead to staying in your comfort zone</a:t>
             </a:r>
           </a:p>
           <a:p>
             <a:r>
               <a:rPr lang="en-US" dirty="0"/>
-              <a:t>Your network</a:t>
+              <a:t>Trust yourself and your abilities</a:t>
             </a:r>
           </a:p>
           <a:p>
             <a:r>
               <a:rPr lang="en-US" dirty="0"/>
-              <a:t>Your recruiter</a:t>
+              <a:t>Be proud of your accomplishments and sell them</a:t>
+            </a:r>
+          </a:p>
+          <a:p>
+            <a:r>
+              <a:rPr lang="en-US" dirty="0"/>
+              <a:t>It’s OK to say “I don’t know”</a:t>
             </a:r>
           </a:p>
         </p:txBody>
@@ -5005,7 +4999,7 @@
           <p:cNvPr id="4" name="Slide Number Placeholder 3">
             <a:extLst>
               <a:ext uri="{FF2B5EF4-FFF2-40B4-BE49-F238E27FC236}">
-                <a16:creationId xmlns:a16="http://schemas.microsoft.com/office/drawing/2014/main" id="{15F580F0-4633-BC44-A27E-E08FF2EC039B}"/>
+                <a16:creationId xmlns:a16="http://schemas.microsoft.com/office/drawing/2014/main" id="{0EE6CF6C-B0BC-444F-9FDF-4F179F64516E}"/>
               </a:ext>
             </a:extLst>
           </p:cNvPr>
@@ -5033,7 +5027,7 @@
     </p:spTree>
     <p:extLst>
       <p:ext uri="{BB962C8B-B14F-4D97-AF65-F5344CB8AC3E}">
-        <p14:creationId xmlns:p14="http://schemas.microsoft.com/office/powerpoint/2010/main" val="666532617"/>
+        <p14:creationId xmlns:p14="http://schemas.microsoft.com/office/powerpoint/2010/main" val="8074757"/>
       </p:ext>
     </p:extLst>
   </p:cSld>
@@ -5065,7 +5059,7 @@
           <p:cNvPr id="2" name="Title 1">
             <a:extLst>
               <a:ext uri="{FF2B5EF4-FFF2-40B4-BE49-F238E27FC236}">
-                <a16:creationId xmlns:a16="http://schemas.microsoft.com/office/drawing/2014/main" id="{344A43CD-EE2A-9A43-B500-9CE9C9DB02F1}"/>
+                <a16:creationId xmlns:a16="http://schemas.microsoft.com/office/drawing/2014/main" id="{8954AD0F-5B5A-C941-B4A0-24D02EF1C004}"/>
               </a:ext>
             </a:extLst>
           </p:cNvPr>
@@ -5083,7 +5077,7 @@
           <a:p>
             <a:r>
               <a:rPr lang="en-US" dirty="0"/>
-              <a:t>Company and culture</a:t>
+              <a:t>Advocates</a:t>
             </a:r>
           </a:p>
         </p:txBody>
@@ -5093,7 +5087,7 @@
           <p:cNvPr id="3" name="Content Placeholder 2">
             <a:extLst>
               <a:ext uri="{FF2B5EF4-FFF2-40B4-BE49-F238E27FC236}">
-                <a16:creationId xmlns:a16="http://schemas.microsoft.com/office/drawing/2014/main" id="{0B51374A-B281-A945-B7F1-E484F684609C}"/>
+                <a16:creationId xmlns:a16="http://schemas.microsoft.com/office/drawing/2014/main" id="{429A578A-09F8-7C47-B721-D07BAB53784F}"/>
               </a:ext>
             </a:extLst>
           </p:cNvPr>
@@ -5111,13 +5105,25 @@
           <a:p>
             <a:r>
               <a:rPr lang="en-US" dirty="0"/>
-              <a:t>Dual career track</a:t>
+              <a:t>Yourself</a:t>
             </a:r>
           </a:p>
           <a:p>
             <a:r>
               <a:rPr lang="en-US" dirty="0"/>
-              <a:t>Internal opportunities and transfers</a:t>
+              <a:t>Your manager</a:t>
+            </a:r>
+          </a:p>
+          <a:p>
+            <a:r>
+              <a:rPr lang="en-US" dirty="0"/>
+              <a:t>Your network</a:t>
+            </a:r>
+          </a:p>
+          <a:p>
+            <a:r>
+              <a:rPr lang="en-US" dirty="0"/>
+              <a:t>Your recruiter</a:t>
             </a:r>
           </a:p>
         </p:txBody>
@@ -5127,7 +5133,7 @@
           <p:cNvPr id="4" name="Slide Number Placeholder 3">
             <a:extLst>
               <a:ext uri="{FF2B5EF4-FFF2-40B4-BE49-F238E27FC236}">
-                <a16:creationId xmlns:a16="http://schemas.microsoft.com/office/drawing/2014/main" id="{664EC6A0-0405-F244-9A26-C249130B5BCE}"/>
+                <a16:creationId xmlns:a16="http://schemas.microsoft.com/office/drawing/2014/main" id="{15F580F0-4633-BC44-A27E-E08FF2EC039B}"/>
               </a:ext>
             </a:extLst>
           </p:cNvPr>
@@ -5155,7 +5161,7 @@
     </p:spTree>
     <p:extLst>
       <p:ext uri="{BB962C8B-B14F-4D97-AF65-F5344CB8AC3E}">
-        <p14:creationId xmlns:p14="http://schemas.microsoft.com/office/powerpoint/2010/main" val="119874331"/>
+        <p14:creationId xmlns:p14="http://schemas.microsoft.com/office/powerpoint/2010/main" val="666532617"/>
       </p:ext>
     </p:extLst>
   </p:cSld>
@@ -5187,7 +5193,7 @@
           <p:cNvPr id="2" name="Title 1">
             <a:extLst>
               <a:ext uri="{FF2B5EF4-FFF2-40B4-BE49-F238E27FC236}">
-                <a16:creationId xmlns:a16="http://schemas.microsoft.com/office/drawing/2014/main" id="{DB3B1B76-B446-6F41-8299-8B42CCEACC8C}"/>
+                <a16:creationId xmlns:a16="http://schemas.microsoft.com/office/drawing/2014/main" id="{344A43CD-EE2A-9A43-B500-9CE9C9DB02F1}"/>
               </a:ext>
             </a:extLst>
           </p:cNvPr>
@@ -5205,7 +5211,7 @@
           <a:p>
             <a:r>
               <a:rPr lang="en-US" dirty="0"/>
-              <a:t>How to hear “Yes”</a:t>
+              <a:t>Company and culture</a:t>
             </a:r>
           </a:p>
         </p:txBody>
@@ -5215,7 +5221,7 @@
           <p:cNvPr id="3" name="Content Placeholder 2">
             <a:extLst>
               <a:ext uri="{FF2B5EF4-FFF2-40B4-BE49-F238E27FC236}">
-                <a16:creationId xmlns:a16="http://schemas.microsoft.com/office/drawing/2014/main" id="{AE5EC6C3-DF94-2C44-B24F-F146510E1EA5}"/>
+                <a16:creationId xmlns:a16="http://schemas.microsoft.com/office/drawing/2014/main" id="{0B51374A-B281-A945-B7F1-E484F684609C}"/>
               </a:ext>
             </a:extLst>
           </p:cNvPr>
@@ -5233,19 +5239,13 @@
           <a:p>
             <a:r>
               <a:rPr lang="en-US" dirty="0"/>
-              <a:t>What is required?</a:t>
+              <a:t>Dual career track</a:t>
             </a:r>
           </a:p>
           <a:p>
             <a:r>
               <a:rPr lang="en-US" dirty="0"/>
-              <a:t>How do I measure up?</a:t>
-            </a:r>
-          </a:p>
-          <a:p>
-            <a:r>
-              <a:rPr lang="en-US" dirty="0"/>
-              <a:t>If I hear “No”, how do I fill the gaps?</a:t>
+              <a:t>Internal opportunities and transfers</a:t>
             </a:r>
           </a:p>
         </p:txBody>
@@ -5255,7 +5255,7 @@
           <p:cNvPr id="4" name="Slide Number Placeholder 3">
             <a:extLst>
               <a:ext uri="{FF2B5EF4-FFF2-40B4-BE49-F238E27FC236}">
-                <a16:creationId xmlns:a16="http://schemas.microsoft.com/office/drawing/2014/main" id="{6D44EBE5-CF43-A346-B7DB-975ACADE664E}"/>
+                <a16:creationId xmlns:a16="http://schemas.microsoft.com/office/drawing/2014/main" id="{664EC6A0-0405-F244-9A26-C249130B5BCE}"/>
               </a:ext>
             </a:extLst>
           </p:cNvPr>
@@ -5283,7 +5283,7 @@
     </p:spTree>
     <p:extLst>
       <p:ext uri="{BB962C8B-B14F-4D97-AF65-F5344CB8AC3E}">
-        <p14:creationId xmlns:p14="http://schemas.microsoft.com/office/powerpoint/2010/main" val="599285132"/>
+        <p14:creationId xmlns:p14="http://schemas.microsoft.com/office/powerpoint/2010/main" val="119874331"/>
       </p:ext>
     </p:extLst>
   </p:cSld>
@@ -5315,7 +5315,7 @@
           <p:cNvPr id="2" name="Title 1">
             <a:extLst>
               <a:ext uri="{FF2B5EF4-FFF2-40B4-BE49-F238E27FC236}">
-                <a16:creationId xmlns:a16="http://schemas.microsoft.com/office/drawing/2014/main" id="{E97B7F77-6548-D24F-A9B3-E534B6999021}"/>
+                <a16:creationId xmlns:a16="http://schemas.microsoft.com/office/drawing/2014/main" id="{DB3B1B76-B446-6F41-8299-8B42CCEACC8C}"/>
               </a:ext>
             </a:extLst>
           </p:cNvPr>
@@ -5333,7 +5333,7 @@
           <a:p>
             <a:r>
               <a:rPr lang="en-US" dirty="0"/>
-              <a:t>Sharpen the saw</a:t>
+              <a:t>How to hear “Yes”</a:t>
             </a:r>
           </a:p>
         </p:txBody>
@@ -5343,7 +5343,7 @@
           <p:cNvPr id="3" name="Content Placeholder 2">
             <a:extLst>
               <a:ext uri="{FF2B5EF4-FFF2-40B4-BE49-F238E27FC236}">
-                <a16:creationId xmlns:a16="http://schemas.microsoft.com/office/drawing/2014/main" id="{CDB59BEC-B9CB-1343-B2DF-C729278F365C}"/>
+                <a16:creationId xmlns:a16="http://schemas.microsoft.com/office/drawing/2014/main" id="{AE5EC6C3-DF94-2C44-B24F-F146510E1EA5}"/>
               </a:ext>
             </a:extLst>
           </p:cNvPr>
@@ -5361,23 +5361,20 @@
           <a:p>
             <a:r>
               <a:rPr lang="en-US" dirty="0"/>
-              <a:t>Side projects</a:t>
+              <a:t>What is required?</a:t>
             </a:r>
           </a:p>
           <a:p>
             <a:r>
               <a:rPr lang="en-US" dirty="0"/>
-              <a:t>Mentor/mentee</a:t>
+              <a:t>How do I measure up?</a:t>
             </a:r>
           </a:p>
           <a:p>
             <a:r>
               <a:rPr lang="en-US" dirty="0"/>
-              <a:t>Conferences and networking</a:t>
-            </a:r>
-          </a:p>
-          <a:p>
-            <a:endParaRPr lang="en-US" dirty="0"/>
+              <a:t>If I hear “No”, how do I fill the gaps?</a:t>
+            </a:r>
           </a:p>
         </p:txBody>
       </p:sp>
@@ -5386,7 +5383,7 @@
           <p:cNvPr id="4" name="Slide Number Placeholder 3">
             <a:extLst>
               <a:ext uri="{FF2B5EF4-FFF2-40B4-BE49-F238E27FC236}">
-                <a16:creationId xmlns:a16="http://schemas.microsoft.com/office/drawing/2014/main" id="{47B7CB7F-3F1C-F144-AB3E-29F2D756EC0E}"/>
+                <a16:creationId xmlns:a16="http://schemas.microsoft.com/office/drawing/2014/main" id="{6D44EBE5-CF43-A346-B7DB-975ACADE664E}"/>
               </a:ext>
             </a:extLst>
           </p:cNvPr>
@@ -5414,7 +5411,7 @@
     </p:spTree>
     <p:extLst>
       <p:ext uri="{BB962C8B-B14F-4D97-AF65-F5344CB8AC3E}">
-        <p14:creationId xmlns:p14="http://schemas.microsoft.com/office/powerpoint/2010/main" val="576557291"/>
+        <p14:creationId xmlns:p14="http://schemas.microsoft.com/office/powerpoint/2010/main" val="599285132"/>
       </p:ext>
     </p:extLst>
   </p:cSld>
@@ -5446,7 +5443,7 @@
           <p:cNvPr id="2" name="Title 1">
             <a:extLst>
               <a:ext uri="{FF2B5EF4-FFF2-40B4-BE49-F238E27FC236}">
-                <a16:creationId xmlns:a16="http://schemas.microsoft.com/office/drawing/2014/main" id="{9E8BF060-B904-A442-9C23-4D721A15AEBD}"/>
+                <a16:creationId xmlns:a16="http://schemas.microsoft.com/office/drawing/2014/main" id="{E97B7F77-6548-D24F-A9B3-E534B6999021}"/>
               </a:ext>
             </a:extLst>
           </p:cNvPr>
@@ -5464,7 +5461,7 @@
           <a:p>
             <a:r>
               <a:rPr lang="en-US" dirty="0"/>
-              <a:t>Track and evaluate</a:t>
+              <a:t>Sharpen the saw</a:t>
             </a:r>
           </a:p>
         </p:txBody>
@@ -5474,7 +5471,7 @@
           <p:cNvPr id="3" name="Content Placeholder 2">
             <a:extLst>
               <a:ext uri="{FF2B5EF4-FFF2-40B4-BE49-F238E27FC236}">
-                <a16:creationId xmlns:a16="http://schemas.microsoft.com/office/drawing/2014/main" id="{7354B787-AA3E-DE47-BEDA-F488058D740D}"/>
+                <a16:creationId xmlns:a16="http://schemas.microsoft.com/office/drawing/2014/main" id="{CDB59BEC-B9CB-1343-B2DF-C729278F365C}"/>
               </a:ext>
             </a:extLst>
           </p:cNvPr>
@@ -5492,20 +5489,23 @@
           <a:p>
             <a:r>
               <a:rPr lang="en-US" dirty="0"/>
-              <a:t>Work diary</a:t>
+              <a:t>Side projects</a:t>
             </a:r>
           </a:p>
           <a:p>
             <a:r>
               <a:rPr lang="en-US" dirty="0"/>
-              <a:t>Update resume regularly</a:t>
+              <a:t>Mentor/mentee</a:t>
             </a:r>
           </a:p>
           <a:p>
             <a:r>
               <a:rPr lang="en-US" dirty="0"/>
-              <a:t>How are things aligning with your dream job?</a:t>
-            </a:r>
+              <a:t>Conferences and networking</a:t>
+            </a:r>
+          </a:p>
+          <a:p>
+            <a:endParaRPr lang="en-US" dirty="0"/>
           </a:p>
         </p:txBody>
       </p:sp>
@@ -5514,7 +5514,7 @@
           <p:cNvPr id="4" name="Slide Number Placeholder 3">
             <a:extLst>
               <a:ext uri="{FF2B5EF4-FFF2-40B4-BE49-F238E27FC236}">
-                <a16:creationId xmlns:a16="http://schemas.microsoft.com/office/drawing/2014/main" id="{E9439F2D-F57D-3945-90B5-FCDF63ACAF86}"/>
+                <a16:creationId xmlns:a16="http://schemas.microsoft.com/office/drawing/2014/main" id="{47B7CB7F-3F1C-F144-AB3E-29F2D756EC0E}"/>
               </a:ext>
             </a:extLst>
           </p:cNvPr>
@@ -5542,7 +5542,7 @@
     </p:spTree>
     <p:extLst>
       <p:ext uri="{BB962C8B-B14F-4D97-AF65-F5344CB8AC3E}">
-        <p14:creationId xmlns:p14="http://schemas.microsoft.com/office/powerpoint/2010/main" val="496456571"/>
+        <p14:creationId xmlns:p14="http://schemas.microsoft.com/office/powerpoint/2010/main" val="576557291"/>
       </p:ext>
     </p:extLst>
   </p:cSld>
@@ -5571,10 +5571,134 @@
       </p:grpSpPr>
       <p:sp>
         <p:nvSpPr>
+          <p:cNvPr id="2" name="Title 1">
+            <a:extLst>
+              <a:ext uri="{FF2B5EF4-FFF2-40B4-BE49-F238E27FC236}">
+                <a16:creationId xmlns:a16="http://schemas.microsoft.com/office/drawing/2014/main" id="{8C2DEA66-5C7D-384C-AEC5-8C2471046168}"/>
+              </a:ext>
+            </a:extLst>
+          </p:cNvPr>
+          <p:cNvSpPr>
+            <a:spLocks noGrp="1"/>
+          </p:cNvSpPr>
+          <p:nvPr>
+            <p:ph type="title"/>
+          </p:nvPr>
+        </p:nvSpPr>
+        <p:spPr/>
+        <p:txBody>
+          <a:bodyPr/>
+          <a:lstStyle/>
+          <a:p>
+            <a:r>
+              <a:rPr lang="en-US" dirty="0"/>
+              <a:t>Agenda</a:t>
+            </a:r>
+          </a:p>
+        </p:txBody>
+      </p:sp>
+      <p:sp>
+        <p:nvSpPr>
+          <p:cNvPr id="3" name="Content Placeholder 2">
+            <a:extLst>
+              <a:ext uri="{FF2B5EF4-FFF2-40B4-BE49-F238E27FC236}">
+                <a16:creationId xmlns:a16="http://schemas.microsoft.com/office/drawing/2014/main" id="{C3529059-B3BB-1040-B5F6-4CB56BED0258}"/>
+              </a:ext>
+            </a:extLst>
+          </p:cNvPr>
+          <p:cNvSpPr>
+            <a:spLocks noGrp="1"/>
+          </p:cNvSpPr>
+          <p:nvPr>
+            <p:ph idx="1"/>
+          </p:nvPr>
+        </p:nvSpPr>
+        <p:spPr/>
+        <p:txBody>
+          <a:bodyPr>
+            <a:normAutofit lnSpcReduction="10000"/>
+          </a:bodyPr>
+          <a:lstStyle/>
+          <a:p>
+            <a:r>
+              <a:rPr lang="en-US" sz="2000" dirty="0"/>
+              <a:t>Before we get started</a:t>
+            </a:r>
+          </a:p>
+          <a:p>
+            <a:r>
+              <a:rPr lang="en-US" sz="2000" dirty="0"/>
+              <a:t>Motivation</a:t>
+            </a:r>
+          </a:p>
+          <a:p>
+            <a:r>
+              <a:rPr lang="en-US" sz="2000" dirty="0"/>
+              <a:t>How I got here</a:t>
+            </a:r>
+          </a:p>
+          <a:p>
+            <a:r>
+              <a:rPr lang="en-US" sz="2000" dirty="0"/>
+              <a:t>Commitment</a:t>
+            </a:r>
+          </a:p>
+          <a:p>
+            <a:r>
+              <a:rPr lang="en-US" sz="2000" dirty="0"/>
+              <a:t>Challenge yourself</a:t>
+            </a:r>
+          </a:p>
+          <a:p>
+            <a:r>
+              <a:rPr lang="en-US" sz="2000" dirty="0"/>
+              <a:t>How to hear “Yes”</a:t>
+            </a:r>
+          </a:p>
+          <a:p>
+            <a:r>
+              <a:rPr lang="en-US" sz="2000" dirty="0"/>
+              <a:t>Imposter syndrome</a:t>
+            </a:r>
+          </a:p>
+          <a:p>
+            <a:r>
+              <a:rPr lang="en-US" sz="2000" dirty="0"/>
+              <a:t>Advocates</a:t>
+            </a:r>
+          </a:p>
+          <a:p>
+            <a:r>
+              <a:rPr lang="en-US" sz="2000" dirty="0"/>
+              <a:t>Company and culture</a:t>
+            </a:r>
+          </a:p>
+          <a:p>
+            <a:r>
+              <a:rPr lang="en-US" sz="2000" dirty="0"/>
+              <a:t>Sharpen the saw</a:t>
+            </a:r>
+          </a:p>
+          <a:p>
+            <a:r>
+              <a:rPr lang="en-US" sz="2000" dirty="0"/>
+              <a:t>Track and evaluate</a:t>
+            </a:r>
+          </a:p>
+          <a:p>
+            <a:endParaRPr lang="en-US" sz="2000" dirty="0"/>
+          </a:p>
+          <a:p>
+            <a:endParaRPr lang="en-US" sz="2000" dirty="0"/>
+          </a:p>
+        </p:txBody>
+      </p:sp>
+      <p:sp>
+        <p:nvSpPr>
           <p:cNvPr id="4" name="Slide Number Placeholder 3">
             <a:extLst>
               <a:ext uri="{FF2B5EF4-FFF2-40B4-BE49-F238E27FC236}">
-                <a16:creationId xmlns:a16="http://schemas.microsoft.com/office/drawing/2014/main" id="{412109C3-9B5F-4745-FA70-7A726350DF79}"/>
+                <a16:creationId xmlns:a16="http://schemas.microsoft.com/office/drawing/2014/main" id="{F82054D9-59E6-CB4C-9F54-3237ADBE4AC9}"/>
               </a:ext>
             </a:extLst>
           </p:cNvPr>
@@ -5594,6 +5718,506 @@
               <a:rPr lang="en-US" smtClean="0"/>
               <a:pPr/>
               <a:t>2</a:t>
+            </a:fld>
+            <a:endParaRPr lang="en-US" dirty="0"/>
+          </a:p>
+        </p:txBody>
+      </p:sp>
+    </p:spTree>
+    <p:extLst>
+      <p:ext uri="{BB962C8B-B14F-4D97-AF65-F5344CB8AC3E}">
+        <p14:creationId xmlns:p14="http://schemas.microsoft.com/office/powerpoint/2010/main" val="4039141470"/>
+      </p:ext>
+    </p:extLst>
+  </p:cSld>
+  <p:clrMapOvr>
+    <a:masterClrMapping/>
+  </p:clrMapOvr>
+</p:sld>
+</file>
+
+<file path=ppt/slides/slide20.xml><?xml version="1.0" encoding="utf-8"?>
+<p:sld xmlns:a="http://schemas.openxmlformats.org/drawingml/2006/main" xmlns:r="http://schemas.openxmlformats.org/officeDocument/2006/relationships" xmlns:p="http://schemas.openxmlformats.org/presentationml/2006/main">
+  <p:cSld>
+    <p:spTree>
+      <p:nvGrpSpPr>
+        <p:cNvPr id="1" name=""/>
+        <p:cNvGrpSpPr/>
+        <p:nvPr/>
+      </p:nvGrpSpPr>
+      <p:grpSpPr>
+        <a:xfrm>
+          <a:off x="0" y="0"/>
+          <a:ext cx="0" cy="0"/>
+          <a:chOff x="0" y="0"/>
+          <a:chExt cx="0" cy="0"/>
+        </a:xfrm>
+      </p:grpSpPr>
+      <p:sp>
+        <p:nvSpPr>
+          <p:cNvPr id="2" name="Title 1">
+            <a:extLst>
+              <a:ext uri="{FF2B5EF4-FFF2-40B4-BE49-F238E27FC236}">
+                <a16:creationId xmlns:a16="http://schemas.microsoft.com/office/drawing/2014/main" id="{9E8BF060-B904-A442-9C23-4D721A15AEBD}"/>
+              </a:ext>
+            </a:extLst>
+          </p:cNvPr>
+          <p:cNvSpPr>
+            <a:spLocks noGrp="1"/>
+          </p:cNvSpPr>
+          <p:nvPr>
+            <p:ph type="title"/>
+          </p:nvPr>
+        </p:nvSpPr>
+        <p:spPr/>
+        <p:txBody>
+          <a:bodyPr/>
+          <a:lstStyle/>
+          <a:p>
+            <a:r>
+              <a:rPr lang="en-US" dirty="0"/>
+              <a:t>Track and evaluate</a:t>
+            </a:r>
+          </a:p>
+        </p:txBody>
+      </p:sp>
+      <p:sp>
+        <p:nvSpPr>
+          <p:cNvPr id="3" name="Content Placeholder 2">
+            <a:extLst>
+              <a:ext uri="{FF2B5EF4-FFF2-40B4-BE49-F238E27FC236}">
+                <a16:creationId xmlns:a16="http://schemas.microsoft.com/office/drawing/2014/main" id="{7354B787-AA3E-DE47-BEDA-F488058D740D}"/>
+              </a:ext>
+            </a:extLst>
+          </p:cNvPr>
+          <p:cNvSpPr>
+            <a:spLocks noGrp="1"/>
+          </p:cNvSpPr>
+          <p:nvPr>
+            <p:ph idx="1"/>
+          </p:nvPr>
+        </p:nvSpPr>
+        <p:spPr/>
+        <p:txBody>
+          <a:bodyPr/>
+          <a:lstStyle/>
+          <a:p>
+            <a:r>
+              <a:rPr lang="en-US" dirty="0"/>
+              <a:t>Work diary</a:t>
+            </a:r>
+          </a:p>
+          <a:p>
+            <a:r>
+              <a:rPr lang="en-US" dirty="0"/>
+              <a:t>Update resume regularly</a:t>
+            </a:r>
+          </a:p>
+          <a:p>
+            <a:r>
+              <a:rPr lang="en-US" dirty="0"/>
+              <a:t>How are things aligning with your dream job?</a:t>
+            </a:r>
+          </a:p>
+        </p:txBody>
+      </p:sp>
+      <p:sp>
+        <p:nvSpPr>
+          <p:cNvPr id="4" name="Slide Number Placeholder 3">
+            <a:extLst>
+              <a:ext uri="{FF2B5EF4-FFF2-40B4-BE49-F238E27FC236}">
+                <a16:creationId xmlns:a16="http://schemas.microsoft.com/office/drawing/2014/main" id="{E9439F2D-F57D-3945-90B5-FCDF63ACAF86}"/>
+              </a:ext>
+            </a:extLst>
+          </p:cNvPr>
+          <p:cNvSpPr>
+            <a:spLocks noGrp="1"/>
+          </p:cNvSpPr>
+          <p:nvPr>
+            <p:ph type="sldNum" sz="quarter" idx="12"/>
+          </p:nvPr>
+        </p:nvSpPr>
+        <p:spPr/>
+        <p:txBody>
+          <a:bodyPr/>
+          <a:lstStyle/>
+          <a:p>
+            <a:fld id="{79CE343B-16C6-1B41-BE63-A1DE79C858D9}" type="slidenum">
+              <a:rPr lang="en-US" smtClean="0"/>
+              <a:pPr/>
+              <a:t>20</a:t>
+            </a:fld>
+            <a:endParaRPr lang="en-US" dirty="0"/>
+          </a:p>
+        </p:txBody>
+      </p:sp>
+    </p:spTree>
+    <p:extLst>
+      <p:ext uri="{BB962C8B-B14F-4D97-AF65-F5344CB8AC3E}">
+        <p14:creationId xmlns:p14="http://schemas.microsoft.com/office/powerpoint/2010/main" val="496456571"/>
+      </p:ext>
+    </p:extLst>
+  </p:cSld>
+  <p:clrMapOvr>
+    <a:masterClrMapping/>
+  </p:clrMapOvr>
+</p:sld>
+</file>
+
+<file path=ppt/slides/slide21.xml><?xml version="1.0" encoding="utf-8"?>
+<p:sld xmlns:a="http://schemas.openxmlformats.org/drawingml/2006/main" xmlns:r="http://schemas.openxmlformats.org/officeDocument/2006/relationships" xmlns:p="http://schemas.openxmlformats.org/presentationml/2006/main">
+  <p:cSld>
+    <p:spTree>
+      <p:nvGrpSpPr>
+        <p:cNvPr id="1" name=""/>
+        <p:cNvGrpSpPr/>
+        <p:nvPr/>
+      </p:nvGrpSpPr>
+      <p:grpSpPr>
+        <a:xfrm>
+          <a:off x="0" y="0"/>
+          <a:ext cx="0" cy="0"/>
+          <a:chOff x="0" y="0"/>
+          <a:chExt cx="0" cy="0"/>
+        </a:xfrm>
+      </p:grpSpPr>
+      <p:sp>
+        <p:nvSpPr>
+          <p:cNvPr id="2" name="Title 1">
+            <a:extLst>
+              <a:ext uri="{FF2B5EF4-FFF2-40B4-BE49-F238E27FC236}">
+                <a16:creationId xmlns:a16="http://schemas.microsoft.com/office/drawing/2014/main" id="{3C78E026-5B3C-C842-B969-79D5E8A37872}"/>
+              </a:ext>
+            </a:extLst>
+          </p:cNvPr>
+          <p:cNvSpPr>
+            <a:spLocks noGrp="1"/>
+          </p:cNvSpPr>
+          <p:nvPr>
+            <p:ph type="title"/>
+          </p:nvPr>
+        </p:nvSpPr>
+        <p:spPr/>
+        <p:txBody>
+          <a:bodyPr/>
+          <a:lstStyle/>
+          <a:p>
+            <a:r>
+              <a:rPr lang="en-US" dirty="0"/>
+              <a:t>Remember</a:t>
+            </a:r>
+          </a:p>
+        </p:txBody>
+      </p:sp>
+      <p:sp>
+        <p:nvSpPr>
+          <p:cNvPr id="3" name="Content Placeholder 2">
+            <a:extLst>
+              <a:ext uri="{FF2B5EF4-FFF2-40B4-BE49-F238E27FC236}">
+                <a16:creationId xmlns:a16="http://schemas.microsoft.com/office/drawing/2014/main" id="{0FE3D2A5-9567-6242-A50F-2703D6E506D6}"/>
+              </a:ext>
+            </a:extLst>
+          </p:cNvPr>
+          <p:cNvSpPr>
+            <a:spLocks noGrp="1"/>
+          </p:cNvSpPr>
+          <p:nvPr>
+            <p:ph idx="1"/>
+          </p:nvPr>
+        </p:nvSpPr>
+        <p:spPr/>
+        <p:txBody>
+          <a:bodyPr anchor="t">
+            <a:normAutofit/>
+          </a:bodyPr>
+          <a:lstStyle/>
+          <a:p>
+            <a:pPr marL="0" indent="0" algn="ctr">
+              <a:buNone/>
+            </a:pPr>
+            <a:endParaRPr lang="en-US" sz="7200" dirty="0"/>
+          </a:p>
+          <a:p>
+            <a:pPr marL="0" indent="0" algn="ctr">
+              <a:buNone/>
+            </a:pPr>
+            <a:r>
+              <a:rPr lang="en-US" sz="7200" dirty="0"/>
+              <a:t>Don’t settle!</a:t>
+            </a:r>
+          </a:p>
+        </p:txBody>
+      </p:sp>
+      <p:sp>
+        <p:nvSpPr>
+          <p:cNvPr id="4" name="Slide Number Placeholder 3">
+            <a:extLst>
+              <a:ext uri="{FF2B5EF4-FFF2-40B4-BE49-F238E27FC236}">
+                <a16:creationId xmlns:a16="http://schemas.microsoft.com/office/drawing/2014/main" id="{0686524B-ED86-2643-AEBD-27FBF59B1869}"/>
+              </a:ext>
+            </a:extLst>
+          </p:cNvPr>
+          <p:cNvSpPr>
+            <a:spLocks noGrp="1"/>
+          </p:cNvSpPr>
+          <p:nvPr>
+            <p:ph type="sldNum" sz="quarter" idx="12"/>
+          </p:nvPr>
+        </p:nvSpPr>
+        <p:spPr/>
+        <p:txBody>
+          <a:bodyPr/>
+          <a:lstStyle/>
+          <a:p>
+            <a:fld id="{79CE343B-16C6-1B41-BE63-A1DE79C858D9}" type="slidenum">
+              <a:rPr lang="en-US" smtClean="0"/>
+              <a:pPr/>
+              <a:t>21</a:t>
+            </a:fld>
+            <a:endParaRPr lang="en-US" dirty="0"/>
+          </a:p>
+        </p:txBody>
+      </p:sp>
+    </p:spTree>
+    <p:extLst>
+      <p:ext uri="{BB962C8B-B14F-4D97-AF65-F5344CB8AC3E}">
+        <p14:creationId xmlns:p14="http://schemas.microsoft.com/office/powerpoint/2010/main" val="1314582162"/>
+      </p:ext>
+    </p:extLst>
+  </p:cSld>
+  <p:clrMapOvr>
+    <a:masterClrMapping/>
+  </p:clrMapOvr>
+</p:sld>
+</file>
+
+<file path=ppt/slides/slide22.xml><?xml version="1.0" encoding="utf-8"?>
+<p:sld xmlns:a="http://schemas.openxmlformats.org/drawingml/2006/main" xmlns:r="http://schemas.openxmlformats.org/officeDocument/2006/relationships" xmlns:p="http://schemas.openxmlformats.org/presentationml/2006/main">
+  <p:cSld>
+    <p:spTree>
+      <p:nvGrpSpPr>
+        <p:cNvPr id="1" name=""/>
+        <p:cNvGrpSpPr/>
+        <p:nvPr/>
+      </p:nvGrpSpPr>
+      <p:grpSpPr>
+        <a:xfrm>
+          <a:off x="0" y="0"/>
+          <a:ext cx="0" cy="0"/>
+          <a:chOff x="0" y="0"/>
+          <a:chExt cx="0" cy="0"/>
+        </a:xfrm>
+      </p:grpSpPr>
+      <p:sp>
+        <p:nvSpPr>
+          <p:cNvPr id="2" name="Title 1">
+            <a:extLst>
+              <a:ext uri="{FF2B5EF4-FFF2-40B4-BE49-F238E27FC236}">
+                <a16:creationId xmlns:a16="http://schemas.microsoft.com/office/drawing/2014/main" id="{EA3A47F6-4BDB-BD4C-AC45-B3094EC7EE07}"/>
+              </a:ext>
+            </a:extLst>
+          </p:cNvPr>
+          <p:cNvSpPr>
+            <a:spLocks noGrp="1"/>
+          </p:cNvSpPr>
+          <p:nvPr>
+            <p:ph type="title"/>
+          </p:nvPr>
+        </p:nvSpPr>
+        <p:spPr/>
+        <p:txBody>
+          <a:bodyPr/>
+          <a:lstStyle/>
+          <a:p>
+            <a:r>
+              <a:rPr lang="en-US" dirty="0"/>
+              <a:t>Questions</a:t>
+            </a:r>
+          </a:p>
+        </p:txBody>
+      </p:sp>
+      <p:sp>
+        <p:nvSpPr>
+          <p:cNvPr id="3" name="Content Placeholder 2">
+            <a:extLst>
+              <a:ext uri="{FF2B5EF4-FFF2-40B4-BE49-F238E27FC236}">
+                <a16:creationId xmlns:a16="http://schemas.microsoft.com/office/drawing/2014/main" id="{625354DF-3A03-5E45-A708-C9E03426674B}"/>
+              </a:ext>
+            </a:extLst>
+          </p:cNvPr>
+          <p:cNvSpPr>
+            <a:spLocks noGrp="1"/>
+          </p:cNvSpPr>
+          <p:nvPr>
+            <p:ph idx="1"/>
+          </p:nvPr>
+        </p:nvSpPr>
+        <p:spPr/>
+        <p:txBody>
+          <a:bodyPr>
+            <a:normAutofit/>
+          </a:bodyPr>
+          <a:lstStyle/>
+          <a:p>
+            <a:r>
+              <a:rPr lang="en-US" dirty="0">
+                <a:hlinkClick r:id="rId2"/>
+              </a:rPr>
+              <a:t>keith.wedinger@hey.com</a:t>
+            </a:r>
+            <a:endParaRPr lang="en-US" dirty="0"/>
+          </a:p>
+          <a:p>
+            <a:r>
+              <a:rPr lang="en-US" dirty="0"/>
+              <a:t>Twitter: @jkwuc89</a:t>
+            </a:r>
+          </a:p>
+          <a:p>
+            <a:r>
+              <a:rPr lang="en-US" dirty="0"/>
+              <a:t>LinkedIn: </a:t>
+            </a:r>
+            <a:r>
+              <a:rPr lang="en-US" dirty="0">
+                <a:hlinkClick r:id="rId3"/>
+              </a:rPr>
+              <a:t>https://www.linkedin.com/in/kwedinger</a:t>
+            </a:r>
+            <a:endParaRPr lang="en-US" dirty="0"/>
+          </a:p>
+          <a:p>
+            <a:r>
+              <a:rPr lang="en-US" dirty="0"/>
+              <a:t>GitHub: </a:t>
+            </a:r>
+            <a:r>
+              <a:rPr lang="en-US" dirty="0">
+                <a:hlinkClick r:id="rId4"/>
+              </a:rPr>
+              <a:t>https://github.com/jkwuc89</a:t>
+            </a:r>
+            <a:endParaRPr lang="en-US" dirty="0"/>
+          </a:p>
+          <a:p>
+            <a:r>
+              <a:rPr lang="en-US" dirty="0"/>
+              <a:t>Untapped (for craft 🍺 folks): jkwuc89</a:t>
+            </a:r>
+          </a:p>
+          <a:p>
+            <a:r>
+              <a:rPr lang="en-US" dirty="0"/>
+              <a:t>This presentation: </a:t>
+            </a:r>
+            <a:r>
+              <a:rPr lang="en-US" dirty="0">
+                <a:hlinkClick r:id="rId5"/>
+              </a:rPr>
+              <a:t>https://bit.ly/3b2FUDZ</a:t>
+            </a:r>
+            <a:endParaRPr lang="en-US" dirty="0"/>
+          </a:p>
+          <a:p>
+            <a:pPr marL="0" indent="0" algn="ctr">
+              <a:buNone/>
+            </a:pPr>
+            <a:r>
+              <a:rPr lang="en-US" sz="5400" dirty="0">
+                <a:solidFill>
+                  <a:srgbClr val="0D6577"/>
+                </a:solidFill>
+              </a:rPr>
+              <a:t>Thanks for attending!</a:t>
+            </a:r>
+          </a:p>
+        </p:txBody>
+      </p:sp>
+      <p:sp>
+        <p:nvSpPr>
+          <p:cNvPr id="4" name="Slide Number Placeholder 3">
+            <a:extLst>
+              <a:ext uri="{FF2B5EF4-FFF2-40B4-BE49-F238E27FC236}">
+                <a16:creationId xmlns:a16="http://schemas.microsoft.com/office/drawing/2014/main" id="{595FD5A8-18F1-014E-BD2D-E3B035D04AC2}"/>
+              </a:ext>
+            </a:extLst>
+          </p:cNvPr>
+          <p:cNvSpPr>
+            <a:spLocks noGrp="1"/>
+          </p:cNvSpPr>
+          <p:nvPr>
+            <p:ph type="sldNum" sz="quarter" idx="12"/>
+          </p:nvPr>
+        </p:nvSpPr>
+        <p:spPr/>
+        <p:txBody>
+          <a:bodyPr/>
+          <a:lstStyle/>
+          <a:p>
+            <a:fld id="{79CE343B-16C6-1B41-BE63-A1DE79C858D9}" type="slidenum">
+              <a:rPr lang="en-US" smtClean="0"/>
+              <a:pPr/>
+              <a:t>22</a:t>
+            </a:fld>
+            <a:endParaRPr lang="en-US" dirty="0"/>
+          </a:p>
+        </p:txBody>
+      </p:sp>
+    </p:spTree>
+    <p:extLst>
+      <p:ext uri="{BB962C8B-B14F-4D97-AF65-F5344CB8AC3E}">
+        <p14:creationId xmlns:p14="http://schemas.microsoft.com/office/powerpoint/2010/main" val="4286239298"/>
+      </p:ext>
+    </p:extLst>
+  </p:cSld>
+  <p:clrMapOvr>
+    <a:masterClrMapping/>
+  </p:clrMapOvr>
+</p:sld>
+</file>
+
+<file path=ppt/slides/slide3.xml><?xml version="1.0" encoding="utf-8"?>
+<p:sld xmlns:a="http://schemas.openxmlformats.org/drawingml/2006/main" xmlns:r="http://schemas.openxmlformats.org/officeDocument/2006/relationships" xmlns:p="http://schemas.openxmlformats.org/presentationml/2006/main">
+  <p:cSld>
+    <p:spTree>
+      <p:nvGrpSpPr>
+        <p:cNvPr id="1" name=""/>
+        <p:cNvGrpSpPr/>
+        <p:nvPr/>
+      </p:nvGrpSpPr>
+      <p:grpSpPr>
+        <a:xfrm>
+          <a:off x="0" y="0"/>
+          <a:ext cx="0" cy="0"/>
+          <a:chOff x="0" y="0"/>
+          <a:chExt cx="0" cy="0"/>
+        </a:xfrm>
+      </p:grpSpPr>
+      <p:sp>
+        <p:nvSpPr>
+          <p:cNvPr id="4" name="Slide Number Placeholder 3">
+            <a:extLst>
+              <a:ext uri="{FF2B5EF4-FFF2-40B4-BE49-F238E27FC236}">
+                <a16:creationId xmlns:a16="http://schemas.microsoft.com/office/drawing/2014/main" id="{412109C3-9B5F-4745-FA70-7A726350DF79}"/>
+              </a:ext>
+            </a:extLst>
+          </p:cNvPr>
+          <p:cNvSpPr>
+            <a:spLocks noGrp="1"/>
+          </p:cNvSpPr>
+          <p:nvPr>
+            <p:ph type="sldNum" sz="quarter" idx="12"/>
+          </p:nvPr>
+        </p:nvSpPr>
+        <p:spPr/>
+        <p:txBody>
+          <a:bodyPr/>
+          <a:lstStyle/>
+          <a:p>
+            <a:fld id="{79CE343B-16C6-1B41-BE63-A1DE79C858D9}" type="slidenum">
+              <a:rPr lang="en-US" smtClean="0"/>
+              <a:pPr/>
+              <a:t>3</a:t>
             </a:fld>
             <a:endParaRPr lang="en-US" dirty="0"/>
           </a:p>
@@ -5642,502 +6266,6 @@
 </p:sld>
 </file>
 
-<file path=ppt/slides/slide20.xml><?xml version="1.0" encoding="utf-8"?>
-<p:sld xmlns:a="http://schemas.openxmlformats.org/drawingml/2006/main" xmlns:r="http://schemas.openxmlformats.org/officeDocument/2006/relationships" xmlns:p="http://schemas.openxmlformats.org/presentationml/2006/main">
-  <p:cSld>
-    <p:spTree>
-      <p:nvGrpSpPr>
-        <p:cNvPr id="1" name=""/>
-        <p:cNvGrpSpPr/>
-        <p:nvPr/>
-      </p:nvGrpSpPr>
-      <p:grpSpPr>
-        <a:xfrm>
-          <a:off x="0" y="0"/>
-          <a:ext cx="0" cy="0"/>
-          <a:chOff x="0" y="0"/>
-          <a:chExt cx="0" cy="0"/>
-        </a:xfrm>
-      </p:grpSpPr>
-      <p:sp>
-        <p:nvSpPr>
-          <p:cNvPr id="2" name="Title 1">
-            <a:extLst>
-              <a:ext uri="{FF2B5EF4-FFF2-40B4-BE49-F238E27FC236}">
-                <a16:creationId xmlns:a16="http://schemas.microsoft.com/office/drawing/2014/main" id="{3C78E026-5B3C-C842-B969-79D5E8A37872}"/>
-              </a:ext>
-            </a:extLst>
-          </p:cNvPr>
-          <p:cNvSpPr>
-            <a:spLocks noGrp="1"/>
-          </p:cNvSpPr>
-          <p:nvPr>
-            <p:ph type="title"/>
-          </p:nvPr>
-        </p:nvSpPr>
-        <p:spPr/>
-        <p:txBody>
-          <a:bodyPr/>
-          <a:lstStyle/>
-          <a:p>
-            <a:r>
-              <a:rPr lang="en-US" dirty="0"/>
-              <a:t>Remember</a:t>
-            </a:r>
-          </a:p>
-        </p:txBody>
-      </p:sp>
-      <p:sp>
-        <p:nvSpPr>
-          <p:cNvPr id="3" name="Content Placeholder 2">
-            <a:extLst>
-              <a:ext uri="{FF2B5EF4-FFF2-40B4-BE49-F238E27FC236}">
-                <a16:creationId xmlns:a16="http://schemas.microsoft.com/office/drawing/2014/main" id="{0FE3D2A5-9567-6242-A50F-2703D6E506D6}"/>
-              </a:ext>
-            </a:extLst>
-          </p:cNvPr>
-          <p:cNvSpPr>
-            <a:spLocks noGrp="1"/>
-          </p:cNvSpPr>
-          <p:nvPr>
-            <p:ph idx="1"/>
-          </p:nvPr>
-        </p:nvSpPr>
-        <p:spPr/>
-        <p:txBody>
-          <a:bodyPr anchor="t">
-            <a:normAutofit/>
-          </a:bodyPr>
-          <a:lstStyle/>
-          <a:p>
-            <a:pPr marL="0" indent="0" algn="ctr">
-              <a:buNone/>
-            </a:pPr>
-            <a:endParaRPr lang="en-US" sz="7200" dirty="0"/>
-          </a:p>
-          <a:p>
-            <a:pPr marL="0" indent="0" algn="ctr">
-              <a:buNone/>
-            </a:pPr>
-            <a:r>
-              <a:rPr lang="en-US" sz="7200" dirty="0"/>
-              <a:t>Don’t settle!</a:t>
-            </a:r>
-          </a:p>
-        </p:txBody>
-      </p:sp>
-      <p:sp>
-        <p:nvSpPr>
-          <p:cNvPr id="4" name="Slide Number Placeholder 3">
-            <a:extLst>
-              <a:ext uri="{FF2B5EF4-FFF2-40B4-BE49-F238E27FC236}">
-                <a16:creationId xmlns:a16="http://schemas.microsoft.com/office/drawing/2014/main" id="{0686524B-ED86-2643-AEBD-27FBF59B1869}"/>
-              </a:ext>
-            </a:extLst>
-          </p:cNvPr>
-          <p:cNvSpPr>
-            <a:spLocks noGrp="1"/>
-          </p:cNvSpPr>
-          <p:nvPr>
-            <p:ph type="sldNum" sz="quarter" idx="12"/>
-          </p:nvPr>
-        </p:nvSpPr>
-        <p:spPr/>
-        <p:txBody>
-          <a:bodyPr/>
-          <a:lstStyle/>
-          <a:p>
-            <a:fld id="{79CE343B-16C6-1B41-BE63-A1DE79C858D9}" type="slidenum">
-              <a:rPr lang="en-US" smtClean="0"/>
-              <a:pPr/>
-              <a:t>20</a:t>
-            </a:fld>
-            <a:endParaRPr lang="en-US" dirty="0"/>
-          </a:p>
-        </p:txBody>
-      </p:sp>
-    </p:spTree>
-    <p:extLst>
-      <p:ext uri="{BB962C8B-B14F-4D97-AF65-F5344CB8AC3E}">
-        <p14:creationId xmlns:p14="http://schemas.microsoft.com/office/powerpoint/2010/main" val="1314582162"/>
-      </p:ext>
-    </p:extLst>
-  </p:cSld>
-  <p:clrMapOvr>
-    <a:masterClrMapping/>
-  </p:clrMapOvr>
-</p:sld>
-</file>
-
-<file path=ppt/slides/slide21.xml><?xml version="1.0" encoding="utf-8"?>
-<p:sld xmlns:a="http://schemas.openxmlformats.org/drawingml/2006/main" xmlns:r="http://schemas.openxmlformats.org/officeDocument/2006/relationships" xmlns:p="http://schemas.openxmlformats.org/presentationml/2006/main">
-  <p:cSld>
-    <p:spTree>
-      <p:nvGrpSpPr>
-        <p:cNvPr id="1" name=""/>
-        <p:cNvGrpSpPr/>
-        <p:nvPr/>
-      </p:nvGrpSpPr>
-      <p:grpSpPr>
-        <a:xfrm>
-          <a:off x="0" y="0"/>
-          <a:ext cx="0" cy="0"/>
-          <a:chOff x="0" y="0"/>
-          <a:chExt cx="0" cy="0"/>
-        </a:xfrm>
-      </p:grpSpPr>
-      <p:sp>
-        <p:nvSpPr>
-          <p:cNvPr id="2" name="Title 1">
-            <a:extLst>
-              <a:ext uri="{FF2B5EF4-FFF2-40B4-BE49-F238E27FC236}">
-                <a16:creationId xmlns:a16="http://schemas.microsoft.com/office/drawing/2014/main" id="{EA3A47F6-4BDB-BD4C-AC45-B3094EC7EE07}"/>
-              </a:ext>
-            </a:extLst>
-          </p:cNvPr>
-          <p:cNvSpPr>
-            <a:spLocks noGrp="1"/>
-          </p:cNvSpPr>
-          <p:nvPr>
-            <p:ph type="title"/>
-          </p:nvPr>
-        </p:nvSpPr>
-        <p:spPr/>
-        <p:txBody>
-          <a:bodyPr/>
-          <a:lstStyle/>
-          <a:p>
-            <a:r>
-              <a:rPr lang="en-US" dirty="0"/>
-              <a:t>Questions</a:t>
-            </a:r>
-          </a:p>
-        </p:txBody>
-      </p:sp>
-      <p:sp>
-        <p:nvSpPr>
-          <p:cNvPr id="3" name="Content Placeholder 2">
-            <a:extLst>
-              <a:ext uri="{FF2B5EF4-FFF2-40B4-BE49-F238E27FC236}">
-                <a16:creationId xmlns:a16="http://schemas.microsoft.com/office/drawing/2014/main" id="{625354DF-3A03-5E45-A708-C9E03426674B}"/>
-              </a:ext>
-            </a:extLst>
-          </p:cNvPr>
-          <p:cNvSpPr>
-            <a:spLocks noGrp="1"/>
-          </p:cNvSpPr>
-          <p:nvPr>
-            <p:ph idx="1"/>
-          </p:nvPr>
-        </p:nvSpPr>
-        <p:spPr/>
-        <p:txBody>
-          <a:bodyPr>
-            <a:normAutofit/>
-          </a:bodyPr>
-          <a:lstStyle/>
-          <a:p>
-            <a:r>
-              <a:rPr lang="en-US" dirty="0">
-                <a:hlinkClick r:id="rId2"/>
-              </a:rPr>
-              <a:t>keith.wedinger@hey.com</a:t>
-            </a:r>
-            <a:endParaRPr lang="en-US" dirty="0"/>
-          </a:p>
-          <a:p>
-            <a:r>
-              <a:rPr lang="en-US" dirty="0"/>
-              <a:t>Twitter: @jkwuc89</a:t>
-            </a:r>
-          </a:p>
-          <a:p>
-            <a:r>
-              <a:rPr lang="en-US" dirty="0"/>
-              <a:t>LinkedIn: </a:t>
-            </a:r>
-            <a:r>
-              <a:rPr lang="en-US" dirty="0">
-                <a:hlinkClick r:id="rId3"/>
-              </a:rPr>
-              <a:t>https://www.linkedin.com/in/kwedinger</a:t>
-            </a:r>
-            <a:endParaRPr lang="en-US" dirty="0"/>
-          </a:p>
-          <a:p>
-            <a:r>
-              <a:rPr lang="en-US" dirty="0"/>
-              <a:t>GitHub: </a:t>
-            </a:r>
-            <a:r>
-              <a:rPr lang="en-US" dirty="0">
-                <a:hlinkClick r:id="rId4"/>
-              </a:rPr>
-              <a:t>https://github.com/jkwuc89</a:t>
-            </a:r>
-            <a:endParaRPr lang="en-US" dirty="0"/>
-          </a:p>
-          <a:p>
-            <a:r>
-              <a:rPr lang="en-US" dirty="0"/>
-              <a:t>Untapped (for craft 🍺 folks): jkwuc89</a:t>
-            </a:r>
-          </a:p>
-          <a:p>
-            <a:r>
-              <a:rPr lang="en-US" dirty="0"/>
-              <a:t>This presentation: </a:t>
-            </a:r>
-            <a:r>
-              <a:rPr lang="en-US" dirty="0">
-                <a:hlinkClick r:id="rId5"/>
-              </a:rPr>
-              <a:t>https://bit.ly/3mEk63k</a:t>
-            </a:r>
-            <a:endParaRPr lang="en-US" dirty="0"/>
-          </a:p>
-          <a:p>
-            <a:pPr marL="0" indent="0" algn="ctr">
-              <a:buNone/>
-            </a:pPr>
-            <a:r>
-              <a:rPr lang="en-US" sz="5400" dirty="0">
-                <a:solidFill>
-                  <a:srgbClr val="0D6577"/>
-                </a:solidFill>
-              </a:rPr>
-              <a:t>Thanks for attending!</a:t>
-            </a:r>
-          </a:p>
-        </p:txBody>
-      </p:sp>
-      <p:sp>
-        <p:nvSpPr>
-          <p:cNvPr id="4" name="Slide Number Placeholder 3">
-            <a:extLst>
-              <a:ext uri="{FF2B5EF4-FFF2-40B4-BE49-F238E27FC236}">
-                <a16:creationId xmlns:a16="http://schemas.microsoft.com/office/drawing/2014/main" id="{595FD5A8-18F1-014E-BD2D-E3B035D04AC2}"/>
-              </a:ext>
-            </a:extLst>
-          </p:cNvPr>
-          <p:cNvSpPr>
-            <a:spLocks noGrp="1"/>
-          </p:cNvSpPr>
-          <p:nvPr>
-            <p:ph type="sldNum" sz="quarter" idx="12"/>
-          </p:nvPr>
-        </p:nvSpPr>
-        <p:spPr/>
-        <p:txBody>
-          <a:bodyPr/>
-          <a:lstStyle/>
-          <a:p>
-            <a:fld id="{79CE343B-16C6-1B41-BE63-A1DE79C858D9}" type="slidenum">
-              <a:rPr lang="en-US" smtClean="0"/>
-              <a:pPr/>
-              <a:t>21</a:t>
-            </a:fld>
-            <a:endParaRPr lang="en-US" dirty="0"/>
-          </a:p>
-        </p:txBody>
-      </p:sp>
-    </p:spTree>
-    <p:extLst>
-      <p:ext uri="{BB962C8B-B14F-4D97-AF65-F5344CB8AC3E}">
-        <p14:creationId xmlns:p14="http://schemas.microsoft.com/office/powerpoint/2010/main" val="4286239298"/>
-      </p:ext>
-    </p:extLst>
-  </p:cSld>
-  <p:clrMapOvr>
-    <a:masterClrMapping/>
-  </p:clrMapOvr>
-</p:sld>
-</file>
-
-<file path=ppt/slides/slide3.xml><?xml version="1.0" encoding="utf-8"?>
-<p:sld xmlns:a="http://schemas.openxmlformats.org/drawingml/2006/main" xmlns:r="http://schemas.openxmlformats.org/officeDocument/2006/relationships" xmlns:p="http://schemas.openxmlformats.org/presentationml/2006/main">
-  <p:cSld>
-    <p:spTree>
-      <p:nvGrpSpPr>
-        <p:cNvPr id="1" name=""/>
-        <p:cNvGrpSpPr/>
-        <p:nvPr/>
-      </p:nvGrpSpPr>
-      <p:grpSpPr>
-        <a:xfrm>
-          <a:off x="0" y="0"/>
-          <a:ext cx="0" cy="0"/>
-          <a:chOff x="0" y="0"/>
-          <a:chExt cx="0" cy="0"/>
-        </a:xfrm>
-      </p:grpSpPr>
-      <p:sp>
-        <p:nvSpPr>
-          <p:cNvPr id="2" name="Title 1">
-            <a:extLst>
-              <a:ext uri="{FF2B5EF4-FFF2-40B4-BE49-F238E27FC236}">
-                <a16:creationId xmlns:a16="http://schemas.microsoft.com/office/drawing/2014/main" id="{8C2DEA66-5C7D-384C-AEC5-8C2471046168}"/>
-              </a:ext>
-            </a:extLst>
-          </p:cNvPr>
-          <p:cNvSpPr>
-            <a:spLocks noGrp="1"/>
-          </p:cNvSpPr>
-          <p:nvPr>
-            <p:ph type="title"/>
-          </p:nvPr>
-        </p:nvSpPr>
-        <p:spPr/>
-        <p:txBody>
-          <a:bodyPr/>
-          <a:lstStyle/>
-          <a:p>
-            <a:r>
-              <a:rPr lang="en-US" dirty="0"/>
-              <a:t>Agenda</a:t>
-            </a:r>
-          </a:p>
-        </p:txBody>
-      </p:sp>
-      <p:sp>
-        <p:nvSpPr>
-          <p:cNvPr id="3" name="Content Placeholder 2">
-            <a:extLst>
-              <a:ext uri="{FF2B5EF4-FFF2-40B4-BE49-F238E27FC236}">
-                <a16:creationId xmlns:a16="http://schemas.microsoft.com/office/drawing/2014/main" id="{C3529059-B3BB-1040-B5F6-4CB56BED0258}"/>
-              </a:ext>
-            </a:extLst>
-          </p:cNvPr>
-          <p:cNvSpPr>
-            <a:spLocks noGrp="1"/>
-          </p:cNvSpPr>
-          <p:nvPr>
-            <p:ph idx="1"/>
-          </p:nvPr>
-        </p:nvSpPr>
-        <p:spPr/>
-        <p:txBody>
-          <a:bodyPr>
-            <a:normAutofit lnSpcReduction="10000"/>
-          </a:bodyPr>
-          <a:lstStyle/>
-          <a:p>
-            <a:r>
-              <a:rPr lang="en-US" sz="2000" dirty="0"/>
-              <a:t>Before we get started</a:t>
-            </a:r>
-          </a:p>
-          <a:p>
-            <a:r>
-              <a:rPr lang="en-US" sz="2000" dirty="0"/>
-              <a:t>Motivation</a:t>
-            </a:r>
-          </a:p>
-          <a:p>
-            <a:r>
-              <a:rPr lang="en-US" sz="2000" dirty="0"/>
-              <a:t>How I got here</a:t>
-            </a:r>
-          </a:p>
-          <a:p>
-            <a:r>
-              <a:rPr lang="en-US" sz="2000" dirty="0"/>
-              <a:t>Commitment</a:t>
-            </a:r>
-          </a:p>
-          <a:p>
-            <a:r>
-              <a:rPr lang="en-US" sz="2000" dirty="0"/>
-              <a:t>Challenge yourself</a:t>
-            </a:r>
-          </a:p>
-          <a:p>
-            <a:r>
-              <a:rPr lang="en-US" sz="2000" dirty="0"/>
-              <a:t>How to hear “Yes”</a:t>
-            </a:r>
-          </a:p>
-          <a:p>
-            <a:r>
-              <a:rPr lang="en-US" sz="2000" dirty="0"/>
-              <a:t>Imposter syndrome</a:t>
-            </a:r>
-          </a:p>
-          <a:p>
-            <a:r>
-              <a:rPr lang="en-US" sz="2000" dirty="0"/>
-              <a:t>Advocates</a:t>
-            </a:r>
-          </a:p>
-          <a:p>
-            <a:r>
-              <a:rPr lang="en-US" sz="2000" dirty="0"/>
-              <a:t>Company and culture</a:t>
-            </a:r>
-          </a:p>
-          <a:p>
-            <a:r>
-              <a:rPr lang="en-US" sz="2000" dirty="0"/>
-              <a:t>Sharpen the saw</a:t>
-            </a:r>
-          </a:p>
-          <a:p>
-            <a:r>
-              <a:rPr lang="en-US" sz="2000" dirty="0"/>
-              <a:t>Track and evaluate</a:t>
-            </a:r>
-          </a:p>
-          <a:p>
-            <a:endParaRPr lang="en-US" sz="2000" dirty="0"/>
-          </a:p>
-          <a:p>
-            <a:endParaRPr lang="en-US" sz="2000" dirty="0"/>
-          </a:p>
-        </p:txBody>
-      </p:sp>
-      <p:sp>
-        <p:nvSpPr>
-          <p:cNvPr id="4" name="Slide Number Placeholder 3">
-            <a:extLst>
-              <a:ext uri="{FF2B5EF4-FFF2-40B4-BE49-F238E27FC236}">
-                <a16:creationId xmlns:a16="http://schemas.microsoft.com/office/drawing/2014/main" id="{F82054D9-59E6-CB4C-9F54-3237ADBE4AC9}"/>
-              </a:ext>
-            </a:extLst>
-          </p:cNvPr>
-          <p:cNvSpPr>
-            <a:spLocks noGrp="1"/>
-          </p:cNvSpPr>
-          <p:nvPr>
-            <p:ph type="sldNum" sz="quarter" idx="12"/>
-          </p:nvPr>
-        </p:nvSpPr>
-        <p:spPr/>
-        <p:txBody>
-          <a:bodyPr/>
-          <a:lstStyle/>
-          <a:p>
-            <a:fld id="{79CE343B-16C6-1B41-BE63-A1DE79C858D9}" type="slidenum">
-              <a:rPr lang="en-US" smtClean="0"/>
-              <a:pPr/>
-              <a:t>3</a:t>
-            </a:fld>
-            <a:endParaRPr lang="en-US" dirty="0"/>
-          </a:p>
-        </p:txBody>
-      </p:sp>
-    </p:spTree>
-    <p:extLst>
-      <p:ext uri="{BB962C8B-B14F-4D97-AF65-F5344CB8AC3E}">
-        <p14:creationId xmlns:p14="http://schemas.microsoft.com/office/powerpoint/2010/main" val="4039141470"/>
-      </p:ext>
-    </p:extLst>
-  </p:cSld>
-  <p:clrMapOvr>
-    <a:masterClrMapping/>
-  </p:clrMapOvr>
-</p:sld>
-</file>
-
 <file path=ppt/slides/slide4.xml><?xml version="1.0" encoding="utf-8"?>
 <p:sld xmlns:a="http://schemas.openxmlformats.org/drawingml/2006/main" xmlns:r="http://schemas.openxmlformats.org/officeDocument/2006/relationships" xmlns:p="http://schemas.openxmlformats.org/presentationml/2006/main">
   <p:cSld>
@@ -6273,7 +6401,7 @@
               <a:rPr lang="en-US" dirty="0">
                 <a:hlinkClick r:id="rId3"/>
               </a:rPr>
-              <a:t>https://bit.ly/3mEk63k</a:t>
+              <a:t>https://bit.ly/3b2FUDZ</a:t>
             </a:r>
             <a:endParaRPr lang="en-US" dirty="0"/>
           </a:p>
@@ -6637,111 +6765,224 @@
           <a:chExt cx="0" cy="0"/>
         </a:xfrm>
       </p:grpSpPr>
-      <p:sp>
-        <p:nvSpPr>
-          <p:cNvPr id="2" name="Title 1">
-            <a:extLst>
-              <a:ext uri="{FF2B5EF4-FFF2-40B4-BE49-F238E27FC236}">
-                <a16:creationId xmlns:a16="http://schemas.microsoft.com/office/drawing/2014/main" id="{BE1939E2-04D0-BE4B-8464-D1C72A02803C}"/>
-              </a:ext>
-            </a:extLst>
-          </p:cNvPr>
-          <p:cNvSpPr>
-            <a:spLocks noGrp="1"/>
-          </p:cNvSpPr>
-          <p:nvPr>
-            <p:ph type="title"/>
-          </p:nvPr>
-        </p:nvSpPr>
-        <p:spPr/>
-        <p:txBody>
-          <a:bodyPr/>
-          <a:lstStyle/>
-          <a:p>
-            <a:r>
-              <a:rPr lang="en-US" dirty="0"/>
-              <a:t>Motivation</a:t>
-            </a:r>
-          </a:p>
-        </p:txBody>
-      </p:sp>
-      <p:sp>
-        <p:nvSpPr>
-          <p:cNvPr id="3" name="Content Placeholder 2">
-            <a:extLst>
-              <a:ext uri="{FF2B5EF4-FFF2-40B4-BE49-F238E27FC236}">
-                <a16:creationId xmlns:a16="http://schemas.microsoft.com/office/drawing/2014/main" id="{F0C3904F-51CC-3641-876F-E3E8C2FC8E04}"/>
-              </a:ext>
-            </a:extLst>
-          </p:cNvPr>
-          <p:cNvSpPr>
-            <a:spLocks noGrp="1"/>
-          </p:cNvSpPr>
-          <p:nvPr>
-            <p:ph idx="1"/>
-          </p:nvPr>
-        </p:nvSpPr>
-        <p:spPr/>
-        <p:txBody>
-          <a:bodyPr/>
-          <a:lstStyle/>
-          <a:p>
-            <a:pPr marL="0" indent="0">
-              <a:buNone/>
+      <p:pic>
+        <p:nvPicPr>
+          <p:cNvPr id="5" name="Online Media 4" descr="Steve Jobs Stanford Commencement Speech 2005">
+            <a:hlinkClick r:id="" action="ppaction://media"/>
+            <a:extLst>
+              <a:ext uri="{FF2B5EF4-FFF2-40B4-BE49-F238E27FC236}">
+                <a16:creationId xmlns:a16="http://schemas.microsoft.com/office/drawing/2014/main" id="{41C401D5-560F-8156-ADB1-65E9F0D92331}"/>
+              </a:ext>
+            </a:extLst>
+          </p:cNvPr>
+          <p:cNvPicPr>
+            <a:picLocks noRot="1" noChangeAspect="1"/>
+          </p:cNvPicPr>
+          <p:nvPr>
+            <a:videoFile r:link="rId1"/>
+          </p:nvPr>
+        </p:nvPicPr>
+        <p:blipFill>
+          <a:blip r:embed="rId3"/>
+          <a:stretch>
+            <a:fillRect/>
+          </a:stretch>
+        </p:blipFill>
+        <p:spPr>
+          <a:xfrm>
+            <a:off x="1949450" y="68263"/>
+            <a:ext cx="8293100" cy="6219825"/>
+          </a:xfrm>
+          <a:prstGeom prst="rect">
+            <a:avLst/>
+          </a:prstGeom>
+          <a:noFill/>
+        </p:spPr>
+      </p:pic>
+      <p:sp>
+        <p:nvSpPr>
+          <p:cNvPr id="4" name="Slide Number Placeholder 3" hidden="1">
+            <a:extLst>
+              <a:ext uri="{FF2B5EF4-FFF2-40B4-BE49-F238E27FC236}">
+                <a16:creationId xmlns:a16="http://schemas.microsoft.com/office/drawing/2014/main" id="{DA32CBCB-8267-E746-8AA4-D5EFFD75ABA3}"/>
+              </a:ext>
+            </a:extLst>
+          </p:cNvPr>
+          <p:cNvSpPr>
+            <a:spLocks noGrp="1"/>
+          </p:cNvSpPr>
+          <p:nvPr>
+            <p:ph type="sldNum" sz="quarter" idx="12"/>
+          </p:nvPr>
+        </p:nvSpPr>
+        <p:spPr/>
+        <p:txBody>
+          <a:bodyPr/>
+          <a:lstStyle/>
+          <a:p>
+            <a:pPr>
+              <a:spcAft>
+                <a:spcPts val="600"/>
+              </a:spcAft>
             </a:pPr>
-            <a:endParaRPr lang="en-US" dirty="0"/>
-          </a:p>
-          <a:p>
-            <a:pPr marL="0" indent="0">
-              <a:buNone/>
-            </a:pPr>
-            <a:r>
-              <a:rPr lang="en-US" dirty="0"/>
-              <a:t>The most qualified and motivated person to advance your career is yourself. If you depend upon others to advance your career, you will be gravely disappointed.</a:t>
-            </a:r>
-          </a:p>
-        </p:txBody>
-      </p:sp>
-      <p:sp>
-        <p:nvSpPr>
-          <p:cNvPr id="4" name="Slide Number Placeholder 3">
-            <a:extLst>
-              <a:ext uri="{FF2B5EF4-FFF2-40B4-BE49-F238E27FC236}">
-                <a16:creationId xmlns:a16="http://schemas.microsoft.com/office/drawing/2014/main" id="{F28CFDEB-DF0A-D747-820A-3F1F8D06FABF}"/>
-              </a:ext>
-            </a:extLst>
-          </p:cNvPr>
-          <p:cNvSpPr>
-            <a:spLocks noGrp="1"/>
-          </p:cNvSpPr>
-          <p:nvPr>
-            <p:ph type="sldNum" sz="quarter" idx="12"/>
-          </p:nvPr>
-        </p:nvSpPr>
-        <p:spPr/>
-        <p:txBody>
-          <a:bodyPr/>
-          <a:lstStyle/>
-          <a:p>
             <a:fld id="{79CE343B-16C6-1B41-BE63-A1DE79C858D9}" type="slidenum">
               <a:rPr lang="en-US" smtClean="0"/>
-              <a:pPr/>
+              <a:pPr>
+                <a:spcAft>
+                  <a:spcPts val="600"/>
+                </a:spcAft>
+              </a:pPr>
               <a:t>7</a:t>
             </a:fld>
-            <a:endParaRPr lang="en-US" dirty="0"/>
+            <a:endParaRPr lang="en-US"/>
           </a:p>
         </p:txBody>
       </p:sp>
     </p:spTree>
     <p:extLst>
       <p:ext uri="{BB962C8B-B14F-4D97-AF65-F5344CB8AC3E}">
-        <p14:creationId xmlns:p14="http://schemas.microsoft.com/office/powerpoint/2010/main" val="3247535124"/>
+        <p14:creationId xmlns:p14="http://schemas.microsoft.com/office/powerpoint/2010/main" val="3817074685"/>
       </p:ext>
     </p:extLst>
   </p:cSld>
   <p:clrMapOvr>
     <a:masterClrMapping/>
   </p:clrMapOvr>
+  <p:timing>
+    <p:tnLst>
+      <p:par>
+        <p:cTn id="1" dur="indefinite" restart="never" nodeType="tmRoot">
+          <p:childTnLst>
+            <p:seq concurrent="1" nextAc="seek">
+              <p:cTn id="2" dur="indefinite" nodeType="mainSeq">
+                <p:childTnLst>
+                  <p:par>
+                    <p:cTn id="3" fill="hold">
+                      <p:stCondLst>
+                        <p:cond delay="indefinite"/>
+                      </p:stCondLst>
+                      <p:childTnLst>
+                        <p:par>
+                          <p:cTn id="4" fill="hold">
+                            <p:stCondLst>
+                              <p:cond delay="0"/>
+                            </p:stCondLst>
+                            <p:childTnLst>
+                              <p:par>
+                                <p:cTn id="5" presetID="1" presetClass="mediacall" presetSubtype="0" fill="hold" nodeType="clickEffect">
+                                  <p:stCondLst>
+                                    <p:cond delay="0"/>
+                                  </p:stCondLst>
+                                  <p:childTnLst>
+                                    <p:cmd type="call" cmd="playFrom(0.0)">
+                                      <p:cBhvr>
+                                        <p:cTn id="6" dur="1" fill="hold"/>
+                                        <p:tgtEl>
+                                          <p:spTgt spid="5"/>
+                                        </p:tgtEl>
+                                      </p:cBhvr>
+                                    </p:cmd>
+                                  </p:childTnLst>
+                                </p:cTn>
+                              </p:par>
+                            </p:childTnLst>
+                          </p:cTn>
+                        </p:par>
+                      </p:childTnLst>
+                    </p:cTn>
+                  </p:par>
+                </p:childTnLst>
+              </p:cTn>
+              <p:prevCondLst>
+                <p:cond evt="onPrev" delay="0">
+                  <p:tgtEl>
+                    <p:sldTgt/>
+                  </p:tgtEl>
+                </p:cond>
+              </p:prevCondLst>
+              <p:nextCondLst>
+                <p:cond evt="onNext" delay="0">
+                  <p:tgtEl>
+                    <p:sldTgt/>
+                  </p:tgtEl>
+                </p:cond>
+              </p:nextCondLst>
+            </p:seq>
+            <p:video>
+              <p:cMediaNode vol="80000">
+                <p:cTn id="7" fill="hold" display="0">
+                  <p:stCondLst>
+                    <p:cond delay="indefinite"/>
+                  </p:stCondLst>
+                </p:cTn>
+                <p:tgtEl>
+                  <p:spTgt spid="5"/>
+                </p:tgtEl>
+              </p:cMediaNode>
+            </p:video>
+            <p:seq concurrent="1" nextAc="seek">
+              <p:cTn id="8" restart="whenNotActive" fill="hold" evtFilter="cancelBubble" nodeType="interactiveSeq">
+                <p:stCondLst>
+                  <p:cond evt="onClick" delay="0">
+                    <p:tgtEl>
+                      <p:spTgt spid="5"/>
+                    </p:tgtEl>
+                  </p:cond>
+                </p:stCondLst>
+                <p:endSync evt="end" delay="0">
+                  <p:rtn val="all"/>
+                </p:endSync>
+                <p:childTnLst>
+                  <p:par>
+                    <p:cTn id="9" fill="hold">
+                      <p:stCondLst>
+                        <p:cond delay="0"/>
+                      </p:stCondLst>
+                      <p:childTnLst>
+                        <p:par>
+                          <p:cTn id="10" fill="hold">
+                            <p:stCondLst>
+                              <p:cond delay="0"/>
+                            </p:stCondLst>
+                            <p:childTnLst>
+                              <p:par>
+                                <p:cTn id="11" presetID="2" presetClass="mediacall" presetSubtype="0" fill="hold" nodeType="clickEffect">
+                                  <p:stCondLst>
+                                    <p:cond delay="0"/>
+                                  </p:stCondLst>
+                                  <p:childTnLst>
+                                    <p:cmd type="call" cmd="togglePause">
+                                      <p:cBhvr>
+                                        <p:cTn id="12" dur="1" fill="hold"/>
+                                        <p:tgtEl>
+                                          <p:spTgt spid="5"/>
+                                        </p:tgtEl>
+                                      </p:cBhvr>
+                                    </p:cmd>
+                                  </p:childTnLst>
+                                </p:cTn>
+                              </p:par>
+                            </p:childTnLst>
+                          </p:cTn>
+                        </p:par>
+                      </p:childTnLst>
+                    </p:cTn>
+                  </p:par>
+                </p:childTnLst>
+              </p:cTn>
+              <p:nextCondLst>
+                <p:cond evt="onClick" delay="0">
+                  <p:tgtEl>
+                    <p:spTgt spid="5"/>
+                  </p:tgtEl>
+                </p:cond>
+              </p:nextCondLst>
+            </p:seq>
+          </p:childTnLst>
+        </p:cTn>
+      </p:par>
+    </p:tnLst>
+  </p:timing>
 </p:sld>
 </file>
 
@@ -6767,7 +7008,7 @@
           <p:cNvPr id="2" name="Title 1">
             <a:extLst>
               <a:ext uri="{FF2B5EF4-FFF2-40B4-BE49-F238E27FC236}">
-                <a16:creationId xmlns:a16="http://schemas.microsoft.com/office/drawing/2014/main" id="{3C78E026-5B3C-C842-B969-79D5E8A37872}"/>
+                <a16:creationId xmlns:a16="http://schemas.microsoft.com/office/drawing/2014/main" id="{BE1939E2-04D0-BE4B-8464-D1C72A02803C}"/>
               </a:ext>
             </a:extLst>
           </p:cNvPr>
@@ -6785,7 +7026,7 @@
           <a:p>
             <a:r>
               <a:rPr lang="en-US" dirty="0"/>
-              <a:t>How I got here</a:t>
+              <a:t>Motivation</a:t>
             </a:r>
           </a:p>
         </p:txBody>
@@ -6795,7 +7036,7 @@
           <p:cNvPr id="3" name="Content Placeholder 2">
             <a:extLst>
               <a:ext uri="{FF2B5EF4-FFF2-40B4-BE49-F238E27FC236}">
-                <a16:creationId xmlns:a16="http://schemas.microsoft.com/office/drawing/2014/main" id="{0FE3D2A5-9567-6242-A50F-2703D6E506D6}"/>
+                <a16:creationId xmlns:a16="http://schemas.microsoft.com/office/drawing/2014/main" id="{F0C3904F-51CC-3641-876F-E3E8C2FC8E04}"/>
               </a:ext>
             </a:extLst>
           </p:cNvPr>
@@ -6808,23 +7049,21 @@
         </p:nvSpPr>
         <p:spPr/>
         <p:txBody>
-          <a:bodyPr anchor="t">
-            <a:normAutofit/>
-          </a:bodyPr>
-          <a:lstStyle/>
-          <a:p>
-            <a:pPr marL="0" indent="0" algn="ctr">
+          <a:bodyPr/>
+          <a:lstStyle/>
+          <a:p>
+            <a:pPr marL="0" indent="0">
               <a:buNone/>
             </a:pPr>
-            <a:endParaRPr lang="en-US" sz="7200" dirty="0"/>
-          </a:p>
-          <a:p>
-            <a:pPr marL="0" indent="0" algn="ctr">
+            <a:endParaRPr lang="en-US" dirty="0"/>
+          </a:p>
+          <a:p>
+            <a:pPr marL="0" indent="0">
               <a:buNone/>
             </a:pPr>
             <a:r>
-              <a:rPr lang="en-US" sz="7200" dirty="0"/>
-              <a:t>I am a nerd!</a:t>
+              <a:rPr lang="en-US" dirty="0"/>
+              <a:t>The most qualified and motivated person to advance your career is yourself. If you depend upon others to advance your career, you will be gravely disappointed.</a:t>
             </a:r>
           </a:p>
         </p:txBody>
@@ -6834,7 +7073,7 @@
           <p:cNvPr id="4" name="Slide Number Placeholder 3">
             <a:extLst>
               <a:ext uri="{FF2B5EF4-FFF2-40B4-BE49-F238E27FC236}">
-                <a16:creationId xmlns:a16="http://schemas.microsoft.com/office/drawing/2014/main" id="{0686524B-ED86-2643-AEBD-27FBF59B1869}"/>
+                <a16:creationId xmlns:a16="http://schemas.microsoft.com/office/drawing/2014/main" id="{F28CFDEB-DF0A-D747-820A-3F1F8D06FABF}"/>
               </a:ext>
             </a:extLst>
           </p:cNvPr>
@@ -6862,7 +7101,7 @@
     </p:spTree>
     <p:extLst>
       <p:ext uri="{BB962C8B-B14F-4D97-AF65-F5344CB8AC3E}">
-        <p14:creationId xmlns:p14="http://schemas.microsoft.com/office/powerpoint/2010/main" val="3308588459"/>
+        <p14:creationId xmlns:p14="http://schemas.microsoft.com/office/powerpoint/2010/main" val="3247535124"/>
       </p:ext>
     </p:extLst>
   </p:cSld>
@@ -6951,7 +7190,7 @@
             </a:pPr>
             <a:r>
               <a:rPr lang="en-US" sz="7200" dirty="0"/>
-              <a:t>I get bored!</a:t>
+              <a:t>I am a nerd!</a:t>
             </a:r>
           </a:p>
         </p:txBody>
@@ -6989,7 +7228,7 @@
     </p:spTree>
     <p:extLst>
       <p:ext uri="{BB962C8B-B14F-4D97-AF65-F5344CB8AC3E}">
-        <p14:creationId xmlns:p14="http://schemas.microsoft.com/office/powerpoint/2010/main" val="2091710618"/>
+        <p14:creationId xmlns:p14="http://schemas.microsoft.com/office/powerpoint/2010/main" val="3308588459"/>
       </p:ext>
     </p:extLst>
   </p:cSld>

</xml_diff>